<commit_message>
update to read me and presentation summary of results
</commit_message>
<xml_diff>
--- a/presentation/E-COMMERCE ANALYSIS WITH GOOGLE MARKETPLACE.pptx
+++ b/presentation/E-COMMERCE ANALYSIS WITH GOOGLE MARKETPLACE.pptx
@@ -29,21 +29,22 @@
     <p:sldId id="274" r:id="rId24"/>
     <p:sldId id="275" r:id="rId25"/>
     <p:sldId id="276" r:id="rId26"/>
+    <p:sldId id="277" r:id="rId27"/>
   </p:sldIdLst>
   <p:sldSz cy="5143500" cx="9144000"/>
   <p:notesSz cx="6858000" cy="9144000"/>
   <p:embeddedFontLst>
     <p:embeddedFont>
       <p:font typeface="Proxima Nova"/>
-      <p:regular r:id="rId27"/>
-      <p:bold r:id="rId28"/>
-      <p:italic r:id="rId29"/>
-      <p:boldItalic r:id="rId30"/>
+      <p:regular r:id="rId28"/>
+      <p:bold r:id="rId29"/>
+      <p:italic r:id="rId30"/>
+      <p:boldItalic r:id="rId31"/>
     </p:embeddedFont>
     <p:embeddedFont>
       <p:font typeface="Oswald"/>
-      <p:regular r:id="rId31"/>
-      <p:bold r:id="rId32"/>
+      <p:regular r:id="rId32"/>
+      <p:bold r:id="rId33"/>
     </p:embeddedFont>
   </p:embeddedFontLst>
   <p:defaultTextStyle>
@@ -824,7 +825,7 @@
   <p:cSld>
     <p:spTree>
       <p:nvGrpSpPr>
-        <p:cNvPr id="119" name="Shape 119"/>
+        <p:cNvPr id="120" name="Shape 120"/>
         <p:cNvGrpSpPr/>
         <p:nvPr/>
       </p:nvGrpSpPr>
@@ -838,7 +839,7 @@
       </p:grpSpPr>
       <p:sp>
         <p:nvSpPr>
-          <p:cNvPr id="120" name="Google Shape;120;gf97915a0d5_0_32:notes"/>
+          <p:cNvPr id="121" name="Google Shape;121;gf97915a0d5_0_32:notes"/>
           <p:cNvSpPr/>
           <p:nvPr>
             <p:ph idx="2" type="sldImg"/>
@@ -873,7 +874,7 @@
       </p:sp>
       <p:sp>
         <p:nvSpPr>
-          <p:cNvPr id="121" name="Google Shape;121;gf97915a0d5_0_32:notes"/>
+          <p:cNvPr id="122" name="Google Shape;122;gf97915a0d5_0_32:notes"/>
           <p:cNvSpPr txBox="1"/>
           <p:nvPr>
             <p:ph idx="1" type="body"/>
@@ -923,7 +924,7 @@
   <p:cSld>
     <p:spTree>
       <p:nvGrpSpPr>
-        <p:cNvPr id="126" name="Shape 126"/>
+        <p:cNvPr id="127" name="Shape 127"/>
         <p:cNvGrpSpPr/>
         <p:nvPr/>
       </p:nvGrpSpPr>
@@ -937,7 +938,7 @@
       </p:grpSpPr>
       <p:sp>
         <p:nvSpPr>
-          <p:cNvPr id="127" name="Google Shape;127;ge4bd2c5308_1_35:notes"/>
+          <p:cNvPr id="128" name="Google Shape;128;gf9a3c7c659_1_1:notes"/>
           <p:cNvSpPr/>
           <p:nvPr>
             <p:ph idx="2" type="sldImg"/>
@@ -972,7 +973,7 @@
       </p:sp>
       <p:sp>
         <p:nvSpPr>
-          <p:cNvPr id="128" name="Google Shape;128;ge4bd2c5308_1_35:notes"/>
+          <p:cNvPr id="129" name="Google Shape;129;gf9a3c7c659_1_1:notes"/>
           <p:cNvSpPr txBox="1"/>
           <p:nvPr>
             <p:ph idx="1" type="body"/>
@@ -1036,7 +1037,7 @@
       </p:grpSpPr>
       <p:sp>
         <p:nvSpPr>
-          <p:cNvPr id="134" name="Google Shape;134;gf97915a0d5_0_43:notes"/>
+          <p:cNvPr id="134" name="Google Shape;134;ge4bd2c5308_1_35:notes"/>
           <p:cNvSpPr/>
           <p:nvPr>
             <p:ph idx="2" type="sldImg"/>
@@ -1071,7 +1072,7 @@
       </p:sp>
       <p:sp>
         <p:nvSpPr>
-          <p:cNvPr id="135" name="Google Shape;135;gf97915a0d5_0_43:notes"/>
+          <p:cNvPr id="135" name="Google Shape;135;ge4bd2c5308_1_35:notes"/>
           <p:cNvSpPr txBox="1"/>
           <p:nvPr>
             <p:ph idx="1" type="body"/>
@@ -1135,7 +1136,7 @@
       </p:grpSpPr>
       <p:sp>
         <p:nvSpPr>
-          <p:cNvPr id="141" name="Google Shape;141;gf97915a0d5_0_51:notes"/>
+          <p:cNvPr id="141" name="Google Shape;141;gf97915a0d5_0_43:notes"/>
           <p:cNvSpPr/>
           <p:nvPr>
             <p:ph idx="2" type="sldImg"/>
@@ -1170,7 +1171,7 @@
       </p:sp>
       <p:sp>
         <p:nvSpPr>
-          <p:cNvPr id="142" name="Google Shape;142;gf97915a0d5_0_51:notes"/>
+          <p:cNvPr id="142" name="Google Shape;142;gf97915a0d5_0_43:notes"/>
           <p:cNvSpPr txBox="1"/>
           <p:nvPr>
             <p:ph idx="1" type="body"/>
@@ -1234,7 +1235,7 @@
       </p:grpSpPr>
       <p:sp>
         <p:nvSpPr>
-          <p:cNvPr id="148" name="Google Shape;148;gf97915a0d5_0_59:notes"/>
+          <p:cNvPr id="148" name="Google Shape;148;gf97915a0d5_0_51:notes"/>
           <p:cNvSpPr/>
           <p:nvPr>
             <p:ph idx="2" type="sldImg"/>
@@ -1269,7 +1270,7 @@
       </p:sp>
       <p:sp>
         <p:nvSpPr>
-          <p:cNvPr id="149" name="Google Shape;149;gf97915a0d5_0_59:notes"/>
+          <p:cNvPr id="149" name="Google Shape;149;gf97915a0d5_0_51:notes"/>
           <p:cNvSpPr txBox="1"/>
           <p:nvPr>
             <p:ph idx="1" type="body"/>
@@ -1333,7 +1334,7 @@
       </p:grpSpPr>
       <p:sp>
         <p:nvSpPr>
-          <p:cNvPr id="155" name="Google Shape;155;gf97915a0d5_0_67:notes"/>
+          <p:cNvPr id="155" name="Google Shape;155;gf97915a0d5_0_59:notes"/>
           <p:cNvSpPr/>
           <p:nvPr>
             <p:ph idx="2" type="sldImg"/>
@@ -1368,7 +1369,7 @@
       </p:sp>
       <p:sp>
         <p:nvSpPr>
-          <p:cNvPr id="156" name="Google Shape;156;gf97915a0d5_0_67:notes"/>
+          <p:cNvPr id="156" name="Google Shape;156;gf97915a0d5_0_59:notes"/>
           <p:cNvSpPr txBox="1"/>
           <p:nvPr>
             <p:ph idx="1" type="body"/>
@@ -1432,7 +1433,7 @@
       </p:grpSpPr>
       <p:sp>
         <p:nvSpPr>
-          <p:cNvPr id="162" name="Google Shape;162;gf97915a0d5_0_75:notes"/>
+          <p:cNvPr id="162" name="Google Shape;162;gf97915a0d5_0_67:notes"/>
           <p:cNvSpPr/>
           <p:nvPr>
             <p:ph idx="2" type="sldImg"/>
@@ -1467,7 +1468,7 @@
       </p:sp>
       <p:sp>
         <p:nvSpPr>
-          <p:cNvPr id="163" name="Google Shape;163;gf97915a0d5_0_75:notes"/>
+          <p:cNvPr id="163" name="Google Shape;163;gf97915a0d5_0_67:notes"/>
           <p:cNvSpPr txBox="1"/>
           <p:nvPr>
             <p:ph idx="1" type="body"/>
@@ -1531,7 +1532,7 @@
       </p:grpSpPr>
       <p:sp>
         <p:nvSpPr>
-          <p:cNvPr id="169" name="Google Shape;169;ge29692a1d9_0_398:notes"/>
+          <p:cNvPr id="169" name="Google Shape;169;gf97915a0d5_0_75:notes"/>
           <p:cNvSpPr/>
           <p:nvPr>
             <p:ph idx="2" type="sldImg"/>
@@ -1566,7 +1567,7 @@
       </p:sp>
       <p:sp>
         <p:nvSpPr>
-          <p:cNvPr id="170" name="Google Shape;170;ge29692a1d9_0_398:notes"/>
+          <p:cNvPr id="170" name="Google Shape;170;gf97915a0d5_0_75:notes"/>
           <p:cNvSpPr txBox="1"/>
           <p:nvPr>
             <p:ph idx="1" type="body"/>
@@ -1616,7 +1617,7 @@
   <p:cSld>
     <p:spTree>
       <p:nvGrpSpPr>
-        <p:cNvPr id="174" name="Shape 174"/>
+        <p:cNvPr id="175" name="Shape 175"/>
         <p:cNvGrpSpPr/>
         <p:nvPr/>
       </p:nvGrpSpPr>
@@ -1630,7 +1631,7 @@
       </p:grpSpPr>
       <p:sp>
         <p:nvSpPr>
-          <p:cNvPr id="175" name="Google Shape;175;ge29692a1d9_0_482:notes"/>
+          <p:cNvPr id="176" name="Google Shape;176;ge29692a1d9_0_398:notes"/>
           <p:cNvSpPr/>
           <p:nvPr>
             <p:ph idx="2" type="sldImg"/>
@@ -1665,7 +1666,7 @@
       </p:sp>
       <p:sp>
         <p:nvSpPr>
-          <p:cNvPr id="176" name="Google Shape;176;ge29692a1d9_0_482:notes"/>
+          <p:cNvPr id="177" name="Google Shape;177;ge29692a1d9_0_398:notes"/>
           <p:cNvSpPr txBox="1"/>
           <p:nvPr>
             <p:ph idx="1" type="body"/>
@@ -1729,7 +1730,7 @@
       </p:grpSpPr>
       <p:sp>
         <p:nvSpPr>
-          <p:cNvPr id="182" name="Google Shape;182;ge29692a1d9_0_456:notes"/>
+          <p:cNvPr id="182" name="Google Shape;182;ge29692a1d9_0_482:notes"/>
           <p:cNvSpPr/>
           <p:nvPr>
             <p:ph idx="2" type="sldImg"/>
@@ -1764,7 +1765,7 @@
       </p:sp>
       <p:sp>
         <p:nvSpPr>
-          <p:cNvPr id="183" name="Google Shape;183;ge29692a1d9_0_456:notes"/>
+          <p:cNvPr id="183" name="Google Shape;183;ge29692a1d9_0_482:notes"/>
           <p:cNvSpPr txBox="1"/>
           <p:nvPr>
             <p:ph idx="1" type="body"/>
@@ -1913,7 +1914,7 @@
   <p:cSld>
     <p:spTree>
       <p:nvGrpSpPr>
-        <p:cNvPr id="187" name="Shape 187"/>
+        <p:cNvPr id="188" name="Shape 188"/>
         <p:cNvGrpSpPr/>
         <p:nvPr/>
       </p:nvGrpSpPr>
@@ -1927,7 +1928,7 @@
       </p:grpSpPr>
       <p:sp>
         <p:nvSpPr>
-          <p:cNvPr id="188" name="Google Shape;188;ge29692a1d9_0_410:notes"/>
+          <p:cNvPr id="189" name="Google Shape;189;ge29692a1d9_0_456:notes"/>
           <p:cNvSpPr/>
           <p:nvPr>
             <p:ph idx="2" type="sldImg"/>
@@ -1962,7 +1963,7 @@
       </p:sp>
       <p:sp>
         <p:nvSpPr>
-          <p:cNvPr id="189" name="Google Shape;189;ge29692a1d9_0_410:notes"/>
+          <p:cNvPr id="190" name="Google Shape;190;ge29692a1d9_0_456:notes"/>
           <p:cNvSpPr txBox="1"/>
           <p:nvPr>
             <p:ph idx="1" type="body"/>
@@ -2012,7 +2013,7 @@
   <p:cSld>
     <p:spTree>
       <p:nvGrpSpPr>
-        <p:cNvPr id="193" name="Shape 193"/>
+        <p:cNvPr id="194" name="Shape 194"/>
         <p:cNvGrpSpPr/>
         <p:nvPr/>
       </p:nvGrpSpPr>
@@ -2026,7 +2027,7 @@
       </p:grpSpPr>
       <p:sp>
         <p:nvSpPr>
-          <p:cNvPr id="194" name="Google Shape;194;ge29692a1d9_0_416:notes"/>
+          <p:cNvPr id="195" name="Google Shape;195;ge29692a1d9_0_410:notes"/>
           <p:cNvSpPr/>
           <p:nvPr>
             <p:ph idx="2" type="sldImg"/>
@@ -2061,7 +2062,106 @@
       </p:sp>
       <p:sp>
         <p:nvSpPr>
-          <p:cNvPr id="195" name="Google Shape;195;ge29692a1d9_0_416:notes"/>
+          <p:cNvPr id="196" name="Google Shape;196;ge29692a1d9_0_410:notes"/>
+          <p:cNvSpPr txBox="1"/>
+          <p:nvPr>
+            <p:ph idx="1" type="body"/>
+          </p:nvPr>
+        </p:nvSpPr>
+        <p:spPr>
+          <a:xfrm>
+            <a:off x="685800" y="4343400"/>
+            <a:ext cx="5486400" cy="4114800"/>
+          </a:xfrm>
+          <a:prstGeom prst="rect">
+            <a:avLst/>
+          </a:prstGeom>
+        </p:spPr>
+        <p:txBody>
+          <a:bodyPr anchorCtr="0" anchor="t" bIns="91425" lIns="91425" spcFirstLastPara="1" rIns="91425" wrap="square" tIns="91425">
+            <a:noAutofit/>
+          </a:bodyPr>
+          <a:lstStyle/>
+          <a:p>
+            <a:pPr indent="0" lvl="0" marL="0" rtl="0" algn="l">
+              <a:spcBef>
+                <a:spcPts val="0"/>
+              </a:spcBef>
+              <a:spcAft>
+                <a:spcPts val="0"/>
+              </a:spcAft>
+              <a:buNone/>
+            </a:pPr>
+            <a:r>
+              <a:t/>
+            </a:r>
+            <a:endParaRPr/>
+          </a:p>
+        </p:txBody>
+      </p:sp>
+    </p:spTree>
+  </p:cSld>
+  <p:clrMapOvr>
+    <a:masterClrMapping/>
+  </p:clrMapOvr>
+</p:notes>
+</file>
+
+<file path=ppt/notesSlides/notesSlide22.xml><?xml version="1.0" encoding="utf-8"?>
+<p:notes xmlns:a="http://schemas.openxmlformats.org/drawingml/2006/main" xmlns:r="http://schemas.openxmlformats.org/officeDocument/2006/relationships" xmlns:mc="http://schemas.openxmlformats.org/markup-compatibility/2006" xmlns:mv="urn:schemas-microsoft-com:mac:vml" xmlns:p="http://schemas.openxmlformats.org/presentationml/2006/main" xmlns:c="http://schemas.openxmlformats.org/drawingml/2006/chart" xmlns:dgm="http://schemas.openxmlformats.org/drawingml/2006/diagram" xmlns:o="urn:schemas-microsoft-com:office:office" xmlns:v="urn:schemas-microsoft-com:vml" xmlns:pvml="urn:schemas-microsoft-com:office:powerpoint" xmlns:com="http://schemas.openxmlformats.org/drawingml/2006/compatibility" xmlns:p14="http://schemas.microsoft.com/office/powerpoint/2010/main" xmlns:p15="http://schemas.microsoft.com/office/powerpoint/2012/main" xmlns:ahyp="http://schemas.microsoft.com/office/drawing/2018/hyperlinkcolor" showMasterPhAnim="0" showMasterSp="0">
+  <p:cSld>
+    <p:spTree>
+      <p:nvGrpSpPr>
+        <p:cNvPr id="200" name="Shape 200"/>
+        <p:cNvGrpSpPr/>
+        <p:nvPr/>
+      </p:nvGrpSpPr>
+      <p:grpSpPr>
+        <a:xfrm>
+          <a:off x="0" y="0"/>
+          <a:ext cx="0" cy="0"/>
+          <a:chOff x="0" y="0"/>
+          <a:chExt cx="0" cy="0"/>
+        </a:xfrm>
+      </p:grpSpPr>
+      <p:sp>
+        <p:nvSpPr>
+          <p:cNvPr id="201" name="Google Shape;201;ge29692a1d9_0_416:notes"/>
+          <p:cNvSpPr/>
+          <p:nvPr>
+            <p:ph idx="2" type="sldImg"/>
+          </p:nvPr>
+        </p:nvSpPr>
+        <p:spPr>
+          <a:xfrm>
+            <a:off x="381300" y="685800"/>
+            <a:ext cx="6096000" cy="3429000"/>
+          </a:xfrm>
+          <a:custGeom>
+            <a:rect b="b" l="l" r="r" t="t"/>
+            <a:pathLst>
+              <a:path extrusionOk="0" h="120000" w="120000">
+                <a:moveTo>
+                  <a:pt x="0" y="0"/>
+                </a:moveTo>
+                <a:lnTo>
+                  <a:pt x="120000" y="0"/>
+                </a:lnTo>
+                <a:lnTo>
+                  <a:pt x="120000" y="120000"/>
+                </a:lnTo>
+                <a:lnTo>
+                  <a:pt x="0" y="120000"/>
+                </a:lnTo>
+                <a:close/>
+              </a:path>
+            </a:pathLst>
+          </a:custGeom>
+        </p:spPr>
+      </p:sp>
+      <p:sp>
+        <p:nvSpPr>
+          <p:cNvPr id="202" name="Google Shape;202;ge29692a1d9_0_416:notes"/>
           <p:cNvSpPr txBox="1"/>
           <p:nvPr>
             <p:ph idx="1" type="body"/>
@@ -2606,7 +2706,7 @@
   <p:cSld>
     <p:spTree>
       <p:nvGrpSpPr>
-        <p:cNvPr id="105" name="Shape 105"/>
+        <p:cNvPr id="106" name="Shape 106"/>
         <p:cNvGrpSpPr/>
         <p:nvPr/>
       </p:nvGrpSpPr>
@@ -2620,7 +2720,7 @@
       </p:grpSpPr>
       <p:sp>
         <p:nvSpPr>
-          <p:cNvPr id="106" name="Google Shape;106;gf97915a0d5_0_19:notes"/>
+          <p:cNvPr id="107" name="Google Shape;107;gf97915a0d5_0_19:notes"/>
           <p:cNvSpPr/>
           <p:nvPr>
             <p:ph idx="2" type="sldImg"/>
@@ -2655,7 +2755,7 @@
       </p:sp>
       <p:sp>
         <p:nvSpPr>
-          <p:cNvPr id="107" name="Google Shape;107;gf97915a0d5_0_19:notes"/>
+          <p:cNvPr id="108" name="Google Shape;108;gf97915a0d5_0_19:notes"/>
           <p:cNvSpPr txBox="1"/>
           <p:nvPr>
             <p:ph idx="1" type="body"/>
@@ -2705,7 +2805,7 @@
   <p:cSld>
     <p:spTree>
       <p:nvGrpSpPr>
-        <p:cNvPr id="112" name="Shape 112"/>
+        <p:cNvPr id="113" name="Shape 113"/>
         <p:cNvGrpSpPr/>
         <p:nvPr/>
       </p:nvGrpSpPr>
@@ -2719,7 +2819,7 @@
       </p:grpSpPr>
       <p:sp>
         <p:nvSpPr>
-          <p:cNvPr id="113" name="Google Shape;113;ge29692a1d9_0_437:notes"/>
+          <p:cNvPr id="114" name="Google Shape;114;ge29692a1d9_0_437:notes"/>
           <p:cNvSpPr/>
           <p:nvPr>
             <p:ph idx="2" type="sldImg"/>
@@ -2754,7 +2854,7 @@
       </p:sp>
       <p:sp>
         <p:nvSpPr>
-          <p:cNvPr id="114" name="Google Shape;114;ge29692a1d9_0_437:notes"/>
+          <p:cNvPr id="115" name="Google Shape;115;ge29692a1d9_0_437:notes"/>
           <p:cNvSpPr txBox="1"/>
           <p:nvPr>
             <p:ph idx="1" type="body"/>
@@ -8278,7 +8378,7 @@
     </p:bg>
     <p:spTree>
       <p:nvGrpSpPr>
-        <p:cNvPr id="122" name="Shape 122"/>
+        <p:cNvPr id="123" name="Shape 123"/>
         <p:cNvGrpSpPr/>
         <p:nvPr/>
       </p:nvGrpSpPr>
@@ -8292,7 +8392,7 @@
       </p:grpSpPr>
       <p:sp>
         <p:nvSpPr>
-          <p:cNvPr id="123" name="Google Shape;123;p22"/>
+          <p:cNvPr id="124" name="Google Shape;124;p22"/>
           <p:cNvSpPr txBox="1"/>
           <p:nvPr>
             <p:ph type="title"/>
@@ -8341,7 +8441,7 @@
       </p:sp>
       <p:pic>
         <p:nvPicPr>
-          <p:cNvPr id="124" name="Google Shape;124;p22"/>
+          <p:cNvPr id="125" name="Google Shape;125;p22"/>
           <p:cNvPicPr preferRelativeResize="0"/>
           <p:nvPr/>
         </p:nvPicPr>
@@ -8369,7 +8469,7 @@
       </p:pic>
       <p:pic>
         <p:nvPicPr>
-          <p:cNvPr id="125" name="Google Shape;125;p22"/>
+          <p:cNvPr id="126" name="Google Shape;126;p22"/>
           <p:cNvPicPr preferRelativeResize="0"/>
           <p:nvPr/>
         </p:nvPicPr>
@@ -8408,7 +8508,7 @@
   <p:cSld>
     <p:spTree>
       <p:nvGrpSpPr>
-        <p:cNvPr id="129" name="Shape 129"/>
+        <p:cNvPr id="130" name="Shape 130"/>
         <p:cNvGrpSpPr/>
         <p:nvPr/>
       </p:nvGrpSpPr>
@@ -8422,7 +8522,7 @@
       </p:grpSpPr>
       <p:sp>
         <p:nvSpPr>
-          <p:cNvPr id="130" name="Google Shape;130;p23"/>
+          <p:cNvPr id="131" name="Google Shape;131;p23"/>
           <p:cNvSpPr txBox="1"/>
           <p:nvPr>
             <p:ph type="title"/>
@@ -8453,81 +8553,386 @@
               <a:buNone/>
             </a:pPr>
             <a:r>
-              <a:rPr lang="en" sz="2500">
-                <a:solidFill>
-                  <a:srgbClr val="FFFFFF"/>
+              <a:rPr lang="en">
+                <a:solidFill>
+                  <a:schemeClr val="lt1"/>
                 </a:solidFill>
               </a:rPr>
-              <a:t>MODELING: CATBOOST,</a:t>
-            </a:r>
-            <a:r>
-              <a:rPr lang="en" sz="2500">
-                <a:solidFill>
-                  <a:schemeClr val="lt1"/>
-                </a:solidFill>
-              </a:rPr>
-              <a:t> ACCURACY: 99.91%</a:t>
-            </a:r>
-            <a:endParaRPr/>
+              <a:t>Methodology</a:t>
+            </a:r>
+            <a:endParaRPr>
+              <a:solidFill>
+                <a:schemeClr val="lt1"/>
+              </a:solidFill>
+            </a:endParaRPr>
           </a:p>
         </p:txBody>
       </p:sp>
-      <p:pic>
-        <p:nvPicPr>
-          <p:cNvPr id="131" name="Google Shape;131;p23"/>
-          <p:cNvPicPr preferRelativeResize="0"/>
-          <p:nvPr/>
-        </p:nvPicPr>
-        <p:blipFill>
-          <a:blip r:embed="rId3">
-            <a:alphaModFix/>
-          </a:blip>
-          <a:stretch>
-            <a:fillRect/>
-          </a:stretch>
-        </p:blipFill>
+      <p:sp>
+        <p:nvSpPr>
+          <p:cNvPr id="132" name="Google Shape;132;p23"/>
+          <p:cNvSpPr txBox="1"/>
+          <p:nvPr>
+            <p:ph idx="1" type="body"/>
+          </p:nvPr>
+        </p:nvSpPr>
         <p:spPr>
           <a:xfrm>
-            <a:off x="311700" y="1017713"/>
-            <a:ext cx="4169555" cy="3820975"/>
+            <a:off x="311700" y="1152475"/>
+            <a:ext cx="7000200" cy="3416400"/>
           </a:xfrm>
           <a:prstGeom prst="rect">
             <a:avLst/>
           </a:prstGeom>
-          <a:noFill/>
-          <a:ln>
-            <a:noFill/>
-          </a:ln>
         </p:spPr>
-      </p:pic>
-      <p:pic>
-        <p:nvPicPr>
-          <p:cNvPr id="132" name="Google Shape;132;p23"/>
-          <p:cNvPicPr preferRelativeResize="0"/>
-          <p:nvPr/>
-        </p:nvPicPr>
-        <p:blipFill>
-          <a:blip r:embed="rId4">
-            <a:alphaModFix/>
-          </a:blip>
-          <a:stretch>
-            <a:fillRect/>
-          </a:stretch>
-        </p:blipFill>
-        <p:spPr>
-          <a:xfrm>
-            <a:off x="4700880" y="1017725"/>
-            <a:ext cx="3858868" cy="3820974"/>
-          </a:xfrm>
-          <a:prstGeom prst="rect">
-            <a:avLst/>
-          </a:prstGeom>
-          <a:noFill/>
-          <a:ln>
-            <a:noFill/>
-          </a:ln>
-        </p:spPr>
-      </p:pic>
+        <p:txBody>
+          <a:bodyPr anchorCtr="0" anchor="t" bIns="91425" lIns="91425" spcFirstLastPara="1" rIns="91425" wrap="square" tIns="91425">
+            <a:normAutofit/>
+          </a:bodyPr>
+          <a:lstStyle/>
+          <a:p>
+            <a:pPr indent="-317500" lvl="0" marL="457200" rtl="0" algn="l">
+              <a:lnSpc>
+                <a:spcPct val="100000"/>
+              </a:lnSpc>
+              <a:spcBef>
+                <a:spcPts val="0"/>
+              </a:spcBef>
+              <a:spcAft>
+                <a:spcPts val="0"/>
+              </a:spcAft>
+              <a:buClr>
+                <a:schemeClr val="lt1"/>
+              </a:buClr>
+              <a:buSzPts val="1400"/>
+              <a:buChar char="●"/>
+            </a:pPr>
+            <a:r>
+              <a:rPr lang="en">
+                <a:solidFill>
+                  <a:schemeClr val="lt1"/>
+                </a:solidFill>
+              </a:rPr>
+              <a:t>Depending on the goals of the company, certain features included may be dropped or added as needed</a:t>
+            </a:r>
+            <a:endParaRPr>
+              <a:solidFill>
+                <a:schemeClr val="lt1"/>
+              </a:solidFill>
+            </a:endParaRPr>
+          </a:p>
+          <a:p>
+            <a:pPr indent="-317500" lvl="0" marL="457200" rtl="0" algn="l">
+              <a:lnSpc>
+                <a:spcPct val="100000"/>
+              </a:lnSpc>
+              <a:spcBef>
+                <a:spcPts val="0"/>
+              </a:spcBef>
+              <a:spcAft>
+                <a:spcPts val="0"/>
+              </a:spcAft>
+              <a:buClr>
+                <a:schemeClr val="lt1"/>
+              </a:buClr>
+              <a:buSzPts val="1400"/>
+              <a:buChar char="●"/>
+            </a:pPr>
+            <a:r>
+              <a:rPr lang="en">
+                <a:solidFill>
+                  <a:schemeClr val="lt1"/>
+                </a:solidFill>
+              </a:rPr>
+              <a:t>The model in its current form is simplified </a:t>
+            </a:r>
+            <a:endParaRPr>
+              <a:solidFill>
+                <a:schemeClr val="lt1"/>
+              </a:solidFill>
+            </a:endParaRPr>
+          </a:p>
+          <a:p>
+            <a:pPr indent="-317500" lvl="0" marL="457200" rtl="0" algn="l">
+              <a:lnSpc>
+                <a:spcPct val="100000"/>
+              </a:lnSpc>
+              <a:spcBef>
+                <a:spcPts val="0"/>
+              </a:spcBef>
+              <a:spcAft>
+                <a:spcPts val="0"/>
+              </a:spcAft>
+              <a:buClr>
+                <a:schemeClr val="lt1"/>
+              </a:buClr>
+              <a:buSzPts val="1400"/>
+              <a:buChar char="●"/>
+            </a:pPr>
+            <a:r>
+              <a:rPr lang="en">
+                <a:solidFill>
+                  <a:schemeClr val="lt1"/>
+                </a:solidFill>
+              </a:rPr>
+              <a:t>Has no consideration for platform constraints which would need to be defined by the company</a:t>
+            </a:r>
+            <a:endParaRPr>
+              <a:solidFill>
+                <a:schemeClr val="lt1"/>
+              </a:solidFill>
+            </a:endParaRPr>
+          </a:p>
+          <a:p>
+            <a:pPr indent="-317500" lvl="0" marL="457200" rtl="0" algn="l">
+              <a:lnSpc>
+                <a:spcPct val="100000"/>
+              </a:lnSpc>
+              <a:spcBef>
+                <a:spcPts val="0"/>
+              </a:spcBef>
+              <a:spcAft>
+                <a:spcPts val="0"/>
+              </a:spcAft>
+              <a:buClr>
+                <a:schemeClr val="lt1"/>
+              </a:buClr>
+              <a:buSzPts val="1400"/>
+              <a:buChar char="●"/>
+            </a:pPr>
+            <a:r>
+              <a:rPr lang="en">
+                <a:solidFill>
+                  <a:schemeClr val="lt1"/>
+                </a:solidFill>
+              </a:rPr>
+              <a:t>Models  used:</a:t>
+            </a:r>
+            <a:endParaRPr>
+              <a:solidFill>
+                <a:schemeClr val="lt1"/>
+              </a:solidFill>
+            </a:endParaRPr>
+          </a:p>
+          <a:p>
+            <a:pPr indent="-317500" lvl="1" marL="914400" rtl="0" algn="l">
+              <a:lnSpc>
+                <a:spcPct val="100000"/>
+              </a:lnSpc>
+              <a:spcBef>
+                <a:spcPts val="0"/>
+              </a:spcBef>
+              <a:spcAft>
+                <a:spcPts val="0"/>
+              </a:spcAft>
+              <a:buClr>
+                <a:schemeClr val="lt1"/>
+              </a:buClr>
+              <a:buSzPts val="1400"/>
+              <a:buChar char="○"/>
+            </a:pPr>
+            <a:r>
+              <a:rPr lang="en" sz="1400">
+                <a:solidFill>
+                  <a:schemeClr val="lt1"/>
+                </a:solidFill>
+              </a:rPr>
+              <a:t>CatBoost</a:t>
+            </a:r>
+            <a:endParaRPr sz="1400">
+              <a:solidFill>
+                <a:schemeClr val="lt1"/>
+              </a:solidFill>
+            </a:endParaRPr>
+          </a:p>
+          <a:p>
+            <a:pPr indent="-317500" lvl="1" marL="914400" rtl="0" algn="l">
+              <a:lnSpc>
+                <a:spcPct val="100000"/>
+              </a:lnSpc>
+              <a:spcBef>
+                <a:spcPts val="0"/>
+              </a:spcBef>
+              <a:spcAft>
+                <a:spcPts val="0"/>
+              </a:spcAft>
+              <a:buClr>
+                <a:schemeClr val="lt1"/>
+              </a:buClr>
+              <a:buSzPts val="1400"/>
+              <a:buChar char="○"/>
+            </a:pPr>
+            <a:r>
+              <a:rPr lang="en" sz="1400">
+                <a:solidFill>
+                  <a:schemeClr val="lt1"/>
+                </a:solidFill>
+              </a:rPr>
+              <a:t>Logistic Regression</a:t>
+            </a:r>
+            <a:endParaRPr sz="1400">
+              <a:solidFill>
+                <a:schemeClr val="lt1"/>
+              </a:solidFill>
+            </a:endParaRPr>
+          </a:p>
+          <a:p>
+            <a:pPr indent="-317500" lvl="1" marL="914400" rtl="0" algn="l">
+              <a:lnSpc>
+                <a:spcPct val="100000"/>
+              </a:lnSpc>
+              <a:spcBef>
+                <a:spcPts val="0"/>
+              </a:spcBef>
+              <a:spcAft>
+                <a:spcPts val="0"/>
+              </a:spcAft>
+              <a:buClr>
+                <a:schemeClr val="lt1"/>
+              </a:buClr>
+              <a:buSzPts val="1400"/>
+              <a:buChar char="○"/>
+            </a:pPr>
+            <a:r>
+              <a:rPr lang="en" sz="1400">
+                <a:solidFill>
+                  <a:schemeClr val="lt1"/>
+                </a:solidFill>
+              </a:rPr>
+              <a:t>Random Trees</a:t>
+            </a:r>
+            <a:endParaRPr sz="1400">
+              <a:solidFill>
+                <a:schemeClr val="lt1"/>
+              </a:solidFill>
+            </a:endParaRPr>
+          </a:p>
+          <a:p>
+            <a:pPr indent="-317500" lvl="0" marL="457200" rtl="0" algn="l">
+              <a:lnSpc>
+                <a:spcPct val="100000"/>
+              </a:lnSpc>
+              <a:spcBef>
+                <a:spcPts val="0"/>
+              </a:spcBef>
+              <a:spcAft>
+                <a:spcPts val="0"/>
+              </a:spcAft>
+              <a:buClr>
+                <a:schemeClr val="lt1"/>
+              </a:buClr>
+              <a:buSzPts val="1400"/>
+              <a:buChar char="●"/>
+            </a:pPr>
+            <a:r>
+              <a:rPr lang="en">
+                <a:solidFill>
+                  <a:schemeClr val="lt1"/>
+                </a:solidFill>
+              </a:rPr>
+              <a:t>Metrics considered</a:t>
+            </a:r>
+            <a:endParaRPr>
+              <a:solidFill>
+                <a:schemeClr val="lt1"/>
+              </a:solidFill>
+            </a:endParaRPr>
+          </a:p>
+          <a:p>
+            <a:pPr indent="-317500" lvl="1" marL="914400" rtl="0" algn="l">
+              <a:lnSpc>
+                <a:spcPct val="100000"/>
+              </a:lnSpc>
+              <a:spcBef>
+                <a:spcPts val="0"/>
+              </a:spcBef>
+              <a:spcAft>
+                <a:spcPts val="0"/>
+              </a:spcAft>
+              <a:buClr>
+                <a:schemeClr val="lt1"/>
+              </a:buClr>
+              <a:buSzPts val="1400"/>
+              <a:buChar char="○"/>
+            </a:pPr>
+            <a:r>
+              <a:rPr lang="en" sz="1400">
+                <a:solidFill>
+                  <a:schemeClr val="lt1"/>
+                </a:solidFill>
+              </a:rPr>
+              <a:t>SHAP value (impact on model output) for CatBoost or feature importance on Random Forest and Logistic Regression</a:t>
+            </a:r>
+            <a:endParaRPr sz="1400">
+              <a:solidFill>
+                <a:schemeClr val="lt1"/>
+              </a:solidFill>
+            </a:endParaRPr>
+          </a:p>
+          <a:p>
+            <a:pPr indent="-317500" lvl="1" marL="914400" rtl="0" algn="l">
+              <a:lnSpc>
+                <a:spcPct val="100000"/>
+              </a:lnSpc>
+              <a:spcBef>
+                <a:spcPts val="0"/>
+              </a:spcBef>
+              <a:spcAft>
+                <a:spcPts val="0"/>
+              </a:spcAft>
+              <a:buClr>
+                <a:schemeClr val="lt1"/>
+              </a:buClr>
+              <a:buSzPts val="1400"/>
+              <a:buChar char="○"/>
+            </a:pPr>
+            <a:r>
+              <a:rPr lang="en" sz="1400">
+                <a:solidFill>
+                  <a:schemeClr val="lt1"/>
+                </a:solidFill>
+              </a:rPr>
+              <a:t>True Positive Rate from the ROC curve</a:t>
+            </a:r>
+            <a:endParaRPr sz="1400">
+              <a:solidFill>
+                <a:schemeClr val="lt1"/>
+              </a:solidFill>
+            </a:endParaRPr>
+          </a:p>
+          <a:p>
+            <a:pPr indent="-317500" lvl="1" marL="914400" rtl="0" algn="l">
+              <a:lnSpc>
+                <a:spcPct val="100000"/>
+              </a:lnSpc>
+              <a:spcBef>
+                <a:spcPts val="0"/>
+              </a:spcBef>
+              <a:spcAft>
+                <a:spcPts val="0"/>
+              </a:spcAft>
+              <a:buClr>
+                <a:schemeClr val="lt1"/>
+              </a:buClr>
+              <a:buSzPts val="1400"/>
+              <a:buChar char="○"/>
+            </a:pPr>
+            <a:r>
+              <a:rPr lang="en" sz="1400">
+                <a:solidFill>
+                  <a:schemeClr val="lt1"/>
+                </a:solidFill>
+              </a:rPr>
+              <a:t>LIFT score for customer segmentation</a:t>
+            </a:r>
+            <a:endParaRPr sz="1400">
+              <a:solidFill>
+                <a:schemeClr val="lt1"/>
+              </a:solidFill>
+            </a:endParaRPr>
+          </a:p>
+        </p:txBody>
+      </p:sp>
     </p:spTree>
   </p:cSld>
   <p:clrMapOvr>
@@ -8572,7 +8977,7 @@
         </p:spPr>
         <p:txBody>
           <a:bodyPr anchorCtr="0" anchor="t" bIns="91425" lIns="91425" spcFirstLastPara="1" rIns="91425" wrap="square" tIns="91425">
-            <a:normAutofit/>
+            <a:normAutofit fontScale="90000"/>
           </a:bodyPr>
           <a:lstStyle/>
           <a:p>
@@ -8591,7 +8996,15 @@
                   <a:srgbClr val="FFFFFF"/>
                 </a:solidFill>
               </a:rPr>
-              <a:t>MODELING: CATBOOST, ACCURACY: 99.91%</a:t>
+              <a:t>MODELING: CATBOOST,</a:t>
+            </a:r>
+            <a:r>
+              <a:rPr lang="en" sz="2500">
+                <a:solidFill>
+                  <a:schemeClr val="lt1"/>
+                </a:solidFill>
+              </a:rPr>
+              <a:t> ACCURACY: 99.91%</a:t>
             </a:r>
             <a:endParaRPr/>
           </a:p>
@@ -8613,8 +9026,8 @@
         </p:blipFill>
         <p:spPr>
           <a:xfrm>
-            <a:off x="4751300" y="1358400"/>
-            <a:ext cx="3781425" cy="2657475"/>
+            <a:off x="311700" y="1017713"/>
+            <a:ext cx="4169555" cy="3820975"/>
           </a:xfrm>
           <a:prstGeom prst="rect">
             <a:avLst/>
@@ -8641,8 +9054,8 @@
         </p:blipFill>
         <p:spPr>
           <a:xfrm>
-            <a:off x="421325" y="1253625"/>
-            <a:ext cx="3914775" cy="2867025"/>
+            <a:off x="4700880" y="1017725"/>
+            <a:ext cx="3858868" cy="3820974"/>
           </a:xfrm>
           <a:prstGeom prst="rect">
             <a:avLst/>
@@ -8716,7 +9129,7 @@
                   <a:srgbClr val="FFFFFF"/>
                 </a:solidFill>
               </a:rPr>
-              <a:t>MODELING: RANDOM FOREST, ACCURACY: 99.99%</a:t>
+              <a:t>MODELING: CATBOOST, ACCURACY: 99.91%</a:t>
             </a:r>
             <a:endParaRPr/>
           </a:p>
@@ -8738,8 +9151,8 @@
         </p:blipFill>
         <p:spPr>
           <a:xfrm>
-            <a:off x="375132" y="1051700"/>
-            <a:ext cx="4604542" cy="3774325"/>
+            <a:off x="4751300" y="1358400"/>
+            <a:ext cx="3781425" cy="2657475"/>
           </a:xfrm>
           <a:prstGeom prst="rect">
             <a:avLst/>
@@ -8766,8 +9179,8 @@
         </p:blipFill>
         <p:spPr>
           <a:xfrm>
-            <a:off x="5166387" y="1051700"/>
-            <a:ext cx="3811763" cy="3774324"/>
+            <a:off x="421325" y="1253625"/>
+            <a:ext cx="3914775" cy="2867025"/>
           </a:xfrm>
           <a:prstGeom prst="rect">
             <a:avLst/>
@@ -8863,8 +9276,8 @@
         </p:blipFill>
         <p:spPr>
           <a:xfrm>
-            <a:off x="4845425" y="1344925"/>
-            <a:ext cx="3781425" cy="2657475"/>
+            <a:off x="375132" y="1051700"/>
+            <a:ext cx="4604542" cy="3774325"/>
           </a:xfrm>
           <a:prstGeom prst="rect">
             <a:avLst/>
@@ -8891,8 +9304,8 @@
         </p:blipFill>
         <p:spPr>
           <a:xfrm>
-            <a:off x="628650" y="1283000"/>
-            <a:ext cx="3943350" cy="2781300"/>
+            <a:off x="5166387" y="1051700"/>
+            <a:ext cx="3811763" cy="3774324"/>
           </a:xfrm>
           <a:prstGeom prst="rect">
             <a:avLst/>
@@ -8966,7 +9379,7 @@
                   <a:srgbClr val="FFFFFF"/>
                 </a:solidFill>
               </a:rPr>
-              <a:t>MODELING: LOGISTIC REGRESSION, ACCURACY: 100%</a:t>
+              <a:t>MODELING: RANDOM FOREST, ACCURACY: 99.99%</a:t>
             </a:r>
             <a:endParaRPr/>
           </a:p>
@@ -8988,8 +9401,8 @@
         </p:blipFill>
         <p:spPr>
           <a:xfrm>
-            <a:off x="425350" y="1017725"/>
-            <a:ext cx="4455925" cy="3592699"/>
+            <a:off x="4845425" y="1344925"/>
+            <a:ext cx="3781425" cy="2657475"/>
           </a:xfrm>
           <a:prstGeom prst="rect">
             <a:avLst/>
@@ -9016,8 +9429,8 @@
         </p:blipFill>
         <p:spPr>
           <a:xfrm>
-            <a:off x="5203953" y="1017725"/>
-            <a:ext cx="3628347" cy="3592700"/>
+            <a:off x="628650" y="1283000"/>
+            <a:ext cx="3943350" cy="2781300"/>
           </a:xfrm>
           <a:prstGeom prst="rect">
             <a:avLst/>
@@ -9113,8 +9526,8 @@
         </p:blipFill>
         <p:spPr>
           <a:xfrm>
-            <a:off x="4795350" y="1398738"/>
-            <a:ext cx="3781425" cy="2657475"/>
+            <a:off x="425350" y="1017725"/>
+            <a:ext cx="4455925" cy="3592699"/>
           </a:xfrm>
           <a:prstGeom prst="rect">
             <a:avLst/>
@@ -9141,8 +9554,8 @@
         </p:blipFill>
         <p:spPr>
           <a:xfrm>
-            <a:off x="504825" y="1308250"/>
-            <a:ext cx="4067175" cy="2838450"/>
+            <a:off x="5203953" y="1017725"/>
+            <a:ext cx="3628347" cy="3592700"/>
           </a:xfrm>
           <a:prstGeom prst="rect">
             <a:avLst/>
@@ -9188,6 +9601,131 @@
         </p:nvSpPr>
         <p:spPr>
           <a:xfrm>
+            <a:off x="311700" y="445025"/>
+            <a:ext cx="8520600" cy="572700"/>
+          </a:xfrm>
+          <a:prstGeom prst="rect">
+            <a:avLst/>
+          </a:prstGeom>
+        </p:spPr>
+        <p:txBody>
+          <a:bodyPr anchorCtr="0" anchor="t" bIns="91425" lIns="91425" spcFirstLastPara="1" rIns="91425" wrap="square" tIns="91425">
+            <a:normAutofit/>
+          </a:bodyPr>
+          <a:lstStyle/>
+          <a:p>
+            <a:pPr indent="0" lvl="0" marL="0" rtl="0" algn="l">
+              <a:spcBef>
+                <a:spcPts val="0"/>
+              </a:spcBef>
+              <a:spcAft>
+                <a:spcPts val="0"/>
+              </a:spcAft>
+              <a:buNone/>
+            </a:pPr>
+            <a:r>
+              <a:rPr lang="en" sz="2500">
+                <a:solidFill>
+                  <a:srgbClr val="FFFFFF"/>
+                </a:solidFill>
+              </a:rPr>
+              <a:t>MODELING: LOGISTIC REGRESSION, ACCURACY: 100%</a:t>
+            </a:r>
+            <a:endParaRPr/>
+          </a:p>
+        </p:txBody>
+      </p:sp>
+      <p:pic>
+        <p:nvPicPr>
+          <p:cNvPr id="173" name="Google Shape;173;p29"/>
+          <p:cNvPicPr preferRelativeResize="0"/>
+          <p:nvPr/>
+        </p:nvPicPr>
+        <p:blipFill>
+          <a:blip r:embed="rId3">
+            <a:alphaModFix/>
+          </a:blip>
+          <a:stretch>
+            <a:fillRect/>
+          </a:stretch>
+        </p:blipFill>
+        <p:spPr>
+          <a:xfrm>
+            <a:off x="4795350" y="1398738"/>
+            <a:ext cx="3781425" cy="2657475"/>
+          </a:xfrm>
+          <a:prstGeom prst="rect">
+            <a:avLst/>
+          </a:prstGeom>
+          <a:noFill/>
+          <a:ln>
+            <a:noFill/>
+          </a:ln>
+        </p:spPr>
+      </p:pic>
+      <p:pic>
+        <p:nvPicPr>
+          <p:cNvPr id="174" name="Google Shape;174;p29"/>
+          <p:cNvPicPr preferRelativeResize="0"/>
+          <p:nvPr/>
+        </p:nvPicPr>
+        <p:blipFill>
+          <a:blip r:embed="rId4">
+            <a:alphaModFix/>
+          </a:blip>
+          <a:stretch>
+            <a:fillRect/>
+          </a:stretch>
+        </p:blipFill>
+        <p:spPr>
+          <a:xfrm>
+            <a:off x="504825" y="1308250"/>
+            <a:ext cx="4067175" cy="2838450"/>
+          </a:xfrm>
+          <a:prstGeom prst="rect">
+            <a:avLst/>
+          </a:prstGeom>
+          <a:noFill/>
+          <a:ln>
+            <a:noFill/>
+          </a:ln>
+        </p:spPr>
+      </p:pic>
+    </p:spTree>
+  </p:cSld>
+  <p:clrMapOvr>
+    <a:masterClrMapping/>
+  </p:clrMapOvr>
+</p:sld>
+</file>
+
+<file path=ppt/slides/slide18.xml><?xml version="1.0" encoding="utf-8"?>
+<p:sld xmlns:a="http://schemas.openxmlformats.org/drawingml/2006/main" xmlns:r="http://schemas.openxmlformats.org/officeDocument/2006/relationships" xmlns:mc="http://schemas.openxmlformats.org/markup-compatibility/2006" xmlns:mv="urn:schemas-microsoft-com:mac:vml" xmlns:p="http://schemas.openxmlformats.org/presentationml/2006/main" xmlns:c="http://schemas.openxmlformats.org/drawingml/2006/chart" xmlns:dgm="http://schemas.openxmlformats.org/drawingml/2006/diagram" xmlns:o="urn:schemas-microsoft-com:office:office" xmlns:v="urn:schemas-microsoft-com:vml" xmlns:pvml="urn:schemas-microsoft-com:office:powerpoint" xmlns:com="http://schemas.openxmlformats.org/drawingml/2006/compatibility" xmlns:p14="http://schemas.microsoft.com/office/powerpoint/2010/main" xmlns:p15="http://schemas.microsoft.com/office/powerpoint/2012/main" xmlns:ahyp="http://schemas.microsoft.com/office/drawing/2018/hyperlinkcolor">
+  <p:cSld>
+    <p:spTree>
+      <p:nvGrpSpPr>
+        <p:cNvPr id="178" name="Shape 178"/>
+        <p:cNvGrpSpPr/>
+        <p:nvPr/>
+      </p:nvGrpSpPr>
+      <p:grpSpPr>
+        <a:xfrm>
+          <a:off x="0" y="0"/>
+          <a:ext cx="0" cy="0"/>
+          <a:chOff x="0" y="0"/>
+          <a:chExt cx="0" cy="0"/>
+        </a:xfrm>
+      </p:grpSpPr>
+      <p:sp>
+        <p:nvSpPr>
+          <p:cNvPr id="179" name="Google Shape;179;p30"/>
+          <p:cNvSpPr txBox="1"/>
+          <p:nvPr>
+            <p:ph type="title"/>
+          </p:nvPr>
+        </p:nvSpPr>
+        <p:spPr>
+          <a:xfrm>
             <a:off x="483725" y="286750"/>
             <a:ext cx="8053800" cy="422700"/>
           </a:xfrm>
@@ -9229,7 +9767,7 @@
       </p:sp>
       <p:sp>
         <p:nvSpPr>
-          <p:cNvPr id="173" name="Google Shape;173;p29"/>
+          <p:cNvPr id="180" name="Google Shape;180;p30"/>
           <p:cNvSpPr txBox="1"/>
           <p:nvPr/>
         </p:nvSpPr>
@@ -9672,317 +10210,6 @@
           </a:p>
         </p:txBody>
       </p:sp>
-    </p:spTree>
-  </p:cSld>
-  <p:clrMapOvr>
-    <a:masterClrMapping/>
-  </p:clrMapOvr>
-</p:sld>
-</file>
-
-<file path=ppt/slides/slide18.xml><?xml version="1.0" encoding="utf-8"?>
-<p:sld xmlns:a="http://schemas.openxmlformats.org/drawingml/2006/main" xmlns:r="http://schemas.openxmlformats.org/officeDocument/2006/relationships" xmlns:mc="http://schemas.openxmlformats.org/markup-compatibility/2006" xmlns:mv="urn:schemas-microsoft-com:mac:vml" xmlns:p="http://schemas.openxmlformats.org/presentationml/2006/main" xmlns:c="http://schemas.openxmlformats.org/drawingml/2006/chart" xmlns:dgm="http://schemas.openxmlformats.org/drawingml/2006/diagram" xmlns:o="urn:schemas-microsoft-com:office:office" xmlns:v="urn:schemas-microsoft-com:vml" xmlns:pvml="urn:schemas-microsoft-com:office:powerpoint" xmlns:com="http://schemas.openxmlformats.org/drawingml/2006/compatibility" xmlns:p14="http://schemas.microsoft.com/office/powerpoint/2010/main" xmlns:p15="http://schemas.microsoft.com/office/powerpoint/2012/main" xmlns:ahyp="http://schemas.microsoft.com/office/drawing/2018/hyperlinkcolor">
-  <p:cSld>
-    <p:spTree>
-      <p:nvGrpSpPr>
-        <p:cNvPr id="177" name="Shape 177"/>
-        <p:cNvGrpSpPr/>
-        <p:nvPr/>
-      </p:nvGrpSpPr>
-      <p:grpSpPr>
-        <a:xfrm>
-          <a:off x="0" y="0"/>
-          <a:ext cx="0" cy="0"/>
-          <a:chOff x="0" y="0"/>
-          <a:chExt cx="0" cy="0"/>
-        </a:xfrm>
-      </p:grpSpPr>
-      <p:sp>
-        <p:nvSpPr>
-          <p:cNvPr id="178" name="Google Shape;178;p30"/>
-          <p:cNvSpPr txBox="1"/>
-          <p:nvPr>
-            <p:ph type="title"/>
-          </p:nvPr>
-        </p:nvSpPr>
-        <p:spPr>
-          <a:xfrm>
-            <a:off x="599075" y="585475"/>
-            <a:ext cx="4085400" cy="435300"/>
-          </a:xfrm>
-          <a:prstGeom prst="rect">
-            <a:avLst/>
-          </a:prstGeom>
-        </p:spPr>
-        <p:txBody>
-          <a:bodyPr anchorCtr="0" anchor="b" bIns="91425" lIns="91425" spcFirstLastPara="1" rIns="91425" wrap="square" tIns="91425">
-            <a:noAutofit/>
-          </a:bodyPr>
-          <a:lstStyle/>
-          <a:p>
-            <a:pPr indent="0" lvl="0" marL="0" rtl="0" algn="l">
-              <a:spcBef>
-                <a:spcPts val="0"/>
-              </a:spcBef>
-              <a:spcAft>
-                <a:spcPts val="0"/>
-              </a:spcAft>
-              <a:buSzPts val="990"/>
-              <a:buNone/>
-            </a:pPr>
-            <a:r>
-              <a:rPr lang="en" sz="2080">
-                <a:solidFill>
-                  <a:schemeClr val="lt1"/>
-                </a:solidFill>
-              </a:rPr>
-              <a:t>APPLICATIONS</a:t>
-            </a:r>
-            <a:endParaRPr sz="2080">
-              <a:solidFill>
-                <a:schemeClr val="lt1"/>
-              </a:solidFill>
-            </a:endParaRPr>
-          </a:p>
-        </p:txBody>
-      </p:sp>
-      <p:sp>
-        <p:nvSpPr>
-          <p:cNvPr id="179" name="Google Shape;179;p30"/>
-          <p:cNvSpPr txBox="1"/>
-          <p:nvPr>
-            <p:ph idx="1" type="subTitle"/>
-          </p:nvPr>
-        </p:nvSpPr>
-        <p:spPr>
-          <a:xfrm>
-            <a:off x="476850" y="1243325"/>
-            <a:ext cx="3970800" cy="2733900"/>
-          </a:xfrm>
-          <a:prstGeom prst="rect">
-            <a:avLst/>
-          </a:prstGeom>
-        </p:spPr>
-        <p:txBody>
-          <a:bodyPr anchorCtr="0" anchor="t" bIns="91425" lIns="91425" spcFirstLastPara="1" rIns="91425" wrap="square" tIns="91425">
-            <a:noAutofit/>
-          </a:bodyPr>
-          <a:lstStyle/>
-          <a:p>
-            <a:pPr indent="-323850" lvl="0" marL="457200" rtl="0" algn="l">
-              <a:spcBef>
-                <a:spcPts val="0"/>
-              </a:spcBef>
-              <a:spcAft>
-                <a:spcPts val="0"/>
-              </a:spcAft>
-              <a:buClr>
-                <a:schemeClr val="lt1"/>
-              </a:buClr>
-              <a:buSzPts val="1500"/>
-              <a:buFont typeface="Arial"/>
-              <a:buChar char="●"/>
-            </a:pPr>
-            <a:r>
-              <a:rPr lang="en" sz="1500">
-                <a:solidFill>
-                  <a:schemeClr val="lt1"/>
-                </a:solidFill>
-                <a:latin typeface="Arial"/>
-                <a:ea typeface="Arial"/>
-                <a:cs typeface="Arial"/>
-                <a:sym typeface="Arial"/>
-              </a:rPr>
-              <a:t>Identify segments of users likely to organically convert </a:t>
-            </a:r>
-            <a:endParaRPr sz="1500">
-              <a:solidFill>
-                <a:schemeClr val="lt1"/>
-              </a:solidFill>
-              <a:latin typeface="Arial"/>
-              <a:ea typeface="Arial"/>
-              <a:cs typeface="Arial"/>
-              <a:sym typeface="Arial"/>
-            </a:endParaRPr>
-          </a:p>
-          <a:p>
-            <a:pPr indent="-323850" lvl="1" marL="914400" rtl="0" algn="l">
-              <a:spcBef>
-                <a:spcPts val="0"/>
-              </a:spcBef>
-              <a:spcAft>
-                <a:spcPts val="0"/>
-              </a:spcAft>
-              <a:buClr>
-                <a:schemeClr val="lt1"/>
-              </a:buClr>
-              <a:buSzPts val="1500"/>
-              <a:buFont typeface="Arial"/>
-              <a:buChar char="○"/>
-            </a:pPr>
-            <a:r>
-              <a:rPr lang="en" sz="1500">
-                <a:solidFill>
-                  <a:schemeClr val="lt1"/>
-                </a:solidFill>
-                <a:latin typeface="Arial"/>
-                <a:ea typeface="Arial"/>
-                <a:cs typeface="Arial"/>
-                <a:sym typeface="Arial"/>
-              </a:rPr>
-              <a:t>allocate budgets to market to this segment and mitigate attribution</a:t>
-            </a:r>
-            <a:endParaRPr sz="1500">
-              <a:solidFill>
-                <a:schemeClr val="lt1"/>
-              </a:solidFill>
-              <a:latin typeface="Arial"/>
-              <a:ea typeface="Arial"/>
-              <a:cs typeface="Arial"/>
-              <a:sym typeface="Arial"/>
-            </a:endParaRPr>
-          </a:p>
-          <a:p>
-            <a:pPr indent="-323850" lvl="1" marL="914400" rtl="0" algn="l">
-              <a:spcBef>
-                <a:spcPts val="0"/>
-              </a:spcBef>
-              <a:spcAft>
-                <a:spcPts val="0"/>
-              </a:spcAft>
-              <a:buClr>
-                <a:schemeClr val="lt1"/>
-              </a:buClr>
-              <a:buSzPts val="1500"/>
-              <a:buFont typeface="Arial"/>
-              <a:buChar char="○"/>
-            </a:pPr>
-            <a:r>
-              <a:rPr lang="en" sz="1500">
-                <a:solidFill>
-                  <a:schemeClr val="lt1"/>
-                </a:solidFill>
-                <a:latin typeface="Arial"/>
-                <a:ea typeface="Arial"/>
-                <a:cs typeface="Arial"/>
-                <a:sym typeface="Arial"/>
-              </a:rPr>
-              <a:t>Optimize email and marketing campaigns to specific users</a:t>
-            </a:r>
-            <a:endParaRPr sz="1500">
-              <a:solidFill>
-                <a:schemeClr val="lt1"/>
-              </a:solidFill>
-              <a:latin typeface="Arial"/>
-              <a:ea typeface="Arial"/>
-              <a:cs typeface="Arial"/>
-              <a:sym typeface="Arial"/>
-            </a:endParaRPr>
-          </a:p>
-          <a:p>
-            <a:pPr indent="-323850" lvl="0" marL="457200" rtl="0" algn="l">
-              <a:spcBef>
-                <a:spcPts val="0"/>
-              </a:spcBef>
-              <a:spcAft>
-                <a:spcPts val="0"/>
-              </a:spcAft>
-              <a:buClr>
-                <a:schemeClr val="lt1"/>
-              </a:buClr>
-              <a:buSzPts val="1500"/>
-              <a:buFont typeface="Arial"/>
-              <a:buChar char="●"/>
-            </a:pPr>
-            <a:r>
-              <a:rPr lang="en" sz="1500">
-                <a:solidFill>
-                  <a:schemeClr val="lt1"/>
-                </a:solidFill>
-                <a:latin typeface="Arial"/>
-                <a:ea typeface="Arial"/>
-                <a:cs typeface="Arial"/>
-                <a:sym typeface="Arial"/>
-              </a:rPr>
-              <a:t>Provide discounts for other segments less likely to convert</a:t>
-            </a:r>
-            <a:endParaRPr sz="1500">
-              <a:solidFill>
-                <a:schemeClr val="lt1"/>
-              </a:solidFill>
-              <a:latin typeface="Arial"/>
-              <a:ea typeface="Arial"/>
-              <a:cs typeface="Arial"/>
-              <a:sym typeface="Arial"/>
-            </a:endParaRPr>
-          </a:p>
-          <a:p>
-            <a:pPr indent="-323850" lvl="1" marL="914400" rtl="0" algn="l">
-              <a:spcBef>
-                <a:spcPts val="0"/>
-              </a:spcBef>
-              <a:spcAft>
-                <a:spcPts val="0"/>
-              </a:spcAft>
-              <a:buClr>
-                <a:schemeClr val="lt1"/>
-              </a:buClr>
-              <a:buSzPts val="1500"/>
-              <a:buFont typeface="Arial"/>
-              <a:buChar char="○"/>
-            </a:pPr>
-            <a:r>
-              <a:rPr lang="en" sz="1500">
-                <a:solidFill>
-                  <a:schemeClr val="lt1"/>
-                </a:solidFill>
-                <a:latin typeface="Arial"/>
-                <a:ea typeface="Arial"/>
-                <a:cs typeface="Arial"/>
-                <a:sym typeface="Arial"/>
-              </a:rPr>
-              <a:t>encourage users to make purchases</a:t>
-            </a:r>
-            <a:endParaRPr sz="1500">
-              <a:solidFill>
-                <a:schemeClr val="lt1"/>
-              </a:solidFill>
-              <a:latin typeface="Arial"/>
-              <a:ea typeface="Arial"/>
-              <a:cs typeface="Arial"/>
-              <a:sym typeface="Arial"/>
-            </a:endParaRPr>
-          </a:p>
-        </p:txBody>
-      </p:sp>
-      <p:pic>
-        <p:nvPicPr>
-          <p:cNvPr id="180" name="Google Shape;180;p30"/>
-          <p:cNvPicPr preferRelativeResize="0"/>
-          <p:nvPr/>
-        </p:nvPicPr>
-        <p:blipFill>
-          <a:blip r:embed="rId3">
-            <a:alphaModFix/>
-          </a:blip>
-          <a:stretch>
-            <a:fillRect/>
-          </a:stretch>
-        </p:blipFill>
-        <p:spPr>
-          <a:xfrm>
-            <a:off x="4571999" y="1090450"/>
-            <a:ext cx="4280801" cy="2849775"/>
-          </a:xfrm>
-          <a:prstGeom prst="rect">
-            <a:avLst/>
-          </a:prstGeom>
-          <a:noFill/>
-          <a:ln>
-            <a:noFill/>
-          </a:ln>
-        </p:spPr>
-      </p:pic>
     </p:spTree>
   </p:cSld>
   <p:clrMapOvr>
@@ -10018,8 +10245,8 @@
         </p:nvSpPr>
         <p:spPr>
           <a:xfrm>
-            <a:off x="976900" y="1636200"/>
-            <a:ext cx="3078600" cy="1716900"/>
+            <a:off x="591675" y="381600"/>
+            <a:ext cx="4085400" cy="435300"/>
           </a:xfrm>
           <a:prstGeom prst="rect">
             <a:avLst/>
@@ -10031,7 +10258,7 @@
           </a:bodyPr>
           <a:lstStyle/>
           <a:p>
-            <a:pPr indent="0" lvl="0" marL="0" rtl="0" algn="ctr">
+            <a:pPr indent="0" lvl="0" marL="0" rtl="0" algn="l">
               <a:spcBef>
                 <a:spcPts val="0"/>
               </a:spcBef>
@@ -10042,14 +10269,14 @@
               <a:buNone/>
             </a:pPr>
             <a:r>
-              <a:rPr lang="en" sz="3259">
+              <a:rPr lang="en" sz="2080">
                 <a:solidFill>
                   <a:schemeClr val="lt1"/>
                 </a:solidFill>
               </a:rPr>
-              <a:t>CONCLUSION &amp; LESSONS LEARNED</a:t>
-            </a:r>
-            <a:endParaRPr sz="3259">
+              <a:t>APPLICATIONS</a:t>
+            </a:r>
+            <a:endParaRPr sz="2080">
               <a:solidFill>
                 <a:schemeClr val="lt1"/>
               </a:solidFill>
@@ -10062,25 +10289,25 @@
           <p:cNvPr id="186" name="Google Shape;186;p31"/>
           <p:cNvSpPr txBox="1"/>
           <p:nvPr>
-            <p:ph idx="2" type="body"/>
+            <p:ph idx="1" type="subTitle"/>
           </p:nvPr>
         </p:nvSpPr>
         <p:spPr>
           <a:xfrm>
-            <a:off x="4388625" y="569850"/>
-            <a:ext cx="4387800" cy="3849600"/>
+            <a:off x="506450" y="861300"/>
+            <a:ext cx="4126500" cy="3041700"/>
           </a:xfrm>
           <a:prstGeom prst="rect">
             <a:avLst/>
           </a:prstGeom>
         </p:spPr>
         <p:txBody>
-          <a:bodyPr anchorCtr="0" anchor="ctr" bIns="91425" lIns="91425" spcFirstLastPara="1" rIns="91425" wrap="square" tIns="91425">
-            <a:normAutofit/>
+          <a:bodyPr anchorCtr="0" anchor="t" bIns="91425" lIns="91425" spcFirstLastPara="1" rIns="91425" wrap="square" tIns="91425">
+            <a:noAutofit/>
           </a:bodyPr>
           <a:lstStyle/>
           <a:p>
-            <a:pPr indent="-349250" lvl="0" marL="457200" rtl="0" algn="l">
+            <a:pPr indent="-323850" lvl="0" marL="457200" rtl="0" algn="l">
               <a:spcBef>
                 <a:spcPts val="0"/>
               </a:spcBef>
@@ -10088,35 +10315,73 @@
                 <a:spcPts val="0"/>
               </a:spcAft>
               <a:buClr>
-                <a:schemeClr val="lt2"/>
+                <a:schemeClr val="lt1"/>
               </a:buClr>
-              <a:buSzPts val="1900"/>
+              <a:buSzPts val="1500"/>
+              <a:buFont typeface="Arial"/>
               <a:buChar char="●"/>
             </a:pPr>
             <a:r>
-              <a:rPr lang="en" sz="1900">
-                <a:solidFill>
-                  <a:schemeClr val="lt2"/>
-                </a:solidFill>
+              <a:rPr lang="en" sz="1500">
+                <a:solidFill>
+                  <a:schemeClr val="lt1"/>
+                </a:solidFill>
+                <a:latin typeface="Arial"/>
+                <a:ea typeface="Arial"/>
+                <a:cs typeface="Arial"/>
+                <a:sym typeface="Arial"/>
               </a:rPr>
-              <a:t>99.91</a:t>
-            </a:r>
-            <a:r>
-              <a:rPr lang="en" sz="1900">
-                <a:solidFill>
-                  <a:schemeClr val="lt2"/>
-                </a:solidFill>
+              <a:t>Identify segments of users likely to organically convert </a:t>
+            </a:r>
+            <a:endParaRPr sz="1500">
+              <a:solidFill>
+                <a:schemeClr val="lt1"/>
+              </a:solidFill>
+              <a:latin typeface="Arial"/>
+              <a:ea typeface="Arial"/>
+              <a:cs typeface="Arial"/>
+              <a:sym typeface="Arial"/>
+            </a:endParaRPr>
+          </a:p>
+          <a:p>
+            <a:pPr indent="-323850" lvl="1" marL="914400" rtl="0" algn="l">
+              <a:spcBef>
+                <a:spcPts val="0"/>
+              </a:spcBef>
+              <a:spcAft>
+                <a:spcPts val="0"/>
+              </a:spcAft>
+              <a:buClr>
+                <a:schemeClr val="lt1"/>
+              </a:buClr>
+              <a:buSzPts val="1500"/>
+              <a:buFont typeface="Arial"/>
+              <a:buChar char="○"/>
+            </a:pPr>
+            <a:r>
+              <a:rPr lang="en" sz="1500">
+                <a:solidFill>
+                  <a:schemeClr val="lt1"/>
+                </a:solidFill>
+                <a:latin typeface="Arial"/>
+                <a:ea typeface="Arial"/>
+                <a:cs typeface="Arial"/>
+                <a:sym typeface="Arial"/>
               </a:rPr>
-              <a:t>% ACCURACY </a:t>
-            </a:r>
-            <a:r>
-              <a:rPr lang="en" sz="1900"/>
-              <a:t>ON CATBOOST MODEL</a:t>
-            </a:r>
-            <a:endParaRPr sz="1900"/>
-          </a:p>
-          <a:p>
-            <a:pPr indent="-349250" lvl="0" marL="457200" rtl="0" algn="l">
+              <a:t>Allocate budget to market to this segment and mitigate attribution</a:t>
+            </a:r>
+            <a:endParaRPr sz="1500">
+              <a:solidFill>
+                <a:schemeClr val="lt1"/>
+              </a:solidFill>
+              <a:latin typeface="Arial"/>
+              <a:ea typeface="Arial"/>
+              <a:cs typeface="Arial"/>
+              <a:sym typeface="Arial"/>
+            </a:endParaRPr>
+          </a:p>
+          <a:p>
+            <a:pPr indent="-323850" lvl="1" marL="914400" rtl="0" algn="l">
               <a:spcBef>
                 <a:spcPts val="0"/>
               </a:spcBef>
@@ -10124,23 +10389,69 @@
                 <a:spcPts val="0"/>
               </a:spcAft>
               <a:buClr>
-                <a:schemeClr val="lt2"/>
+                <a:schemeClr val="lt1"/>
               </a:buClr>
-              <a:buSzPts val="1900"/>
+              <a:buSzPts val="1500"/>
+              <a:buFont typeface="Arial"/>
+              <a:buChar char="○"/>
+            </a:pPr>
+            <a:r>
+              <a:rPr lang="en" sz="1500">
+                <a:solidFill>
+                  <a:schemeClr val="lt1"/>
+                </a:solidFill>
+                <a:latin typeface="Arial"/>
+                <a:ea typeface="Arial"/>
+                <a:cs typeface="Arial"/>
+                <a:sym typeface="Arial"/>
+              </a:rPr>
+              <a:t>Optimize email and marketing campaigns to specific users</a:t>
+            </a:r>
+            <a:endParaRPr sz="1500">
+              <a:solidFill>
+                <a:schemeClr val="lt1"/>
+              </a:solidFill>
+              <a:latin typeface="Arial"/>
+              <a:ea typeface="Arial"/>
+              <a:cs typeface="Arial"/>
+              <a:sym typeface="Arial"/>
+            </a:endParaRPr>
+          </a:p>
+          <a:p>
+            <a:pPr indent="-323850" lvl="0" marL="457200" rtl="0" algn="l">
+              <a:spcBef>
+                <a:spcPts val="0"/>
+              </a:spcBef>
+              <a:spcAft>
+                <a:spcPts val="0"/>
+              </a:spcAft>
+              <a:buClr>
+                <a:schemeClr val="lt1"/>
+              </a:buClr>
+              <a:buSzPts val="1500"/>
+              <a:buFont typeface="Arial"/>
               <a:buChar char="●"/>
             </a:pPr>
             <a:r>
-              <a:rPr lang="en" sz="1900">
-                <a:solidFill>
-                  <a:schemeClr val="lt2"/>
-                </a:solidFill>
+              <a:rPr lang="en" sz="1500">
+                <a:solidFill>
+                  <a:schemeClr val="lt1"/>
+                </a:solidFill>
+                <a:latin typeface="Arial"/>
+                <a:ea typeface="Arial"/>
+                <a:cs typeface="Arial"/>
+                <a:sym typeface="Arial"/>
               </a:rPr>
-              <a:t>PRE-PROCESSING</a:t>
-            </a:r>
-            <a:endParaRPr sz="1900">
+              <a:t>Provide discounts for other segments less likely to convert</a:t>
+            </a:r>
+            <a:endParaRPr sz="1500">
               <a:solidFill>
-                <a:schemeClr val="lt2"/>
+                <a:schemeClr val="lt1"/>
               </a:solidFill>
+              <a:latin typeface="Arial"/>
+              <a:ea typeface="Arial"/>
+              <a:cs typeface="Arial"/>
+              <a:sym typeface="Arial"/>
             </a:endParaRPr>
           </a:p>
           <a:p>
@@ -10151,141 +10462,163 @@
               <a:spcAft>
                 <a:spcPts val="0"/>
               </a:spcAft>
+              <a:buClr>
+                <a:schemeClr val="lt1"/>
+              </a:buClr>
               <a:buSzPts val="1500"/>
+              <a:buFont typeface="Arial"/>
               <a:buChar char="○"/>
             </a:pPr>
             <a:r>
-              <a:rPr lang="en" sz="1500"/>
-              <a:t>Upsampling smaller labels</a:t>
-            </a:r>
-            <a:endParaRPr sz="1500"/>
-          </a:p>
-          <a:p>
-            <a:pPr indent="-323850" lvl="1" marL="914400" rtl="0" algn="l">
-              <a:spcBef>
-                <a:spcPts val="0"/>
-              </a:spcBef>
-              <a:spcAft>
-                <a:spcPts val="0"/>
-              </a:spcAft>
+              <a:rPr lang="en" sz="1500">
+                <a:solidFill>
+                  <a:schemeClr val="lt1"/>
+                </a:solidFill>
+                <a:latin typeface="Arial"/>
+                <a:ea typeface="Arial"/>
+                <a:cs typeface="Arial"/>
+                <a:sym typeface="Arial"/>
+              </a:rPr>
+              <a:t>Encourage users to make purchases</a:t>
+            </a:r>
+            <a:endParaRPr sz="1500">
+              <a:solidFill>
+                <a:schemeClr val="lt1"/>
+              </a:solidFill>
+              <a:latin typeface="Arial"/>
+              <a:ea typeface="Arial"/>
+              <a:cs typeface="Arial"/>
+              <a:sym typeface="Arial"/>
+            </a:endParaRPr>
+          </a:p>
+          <a:p>
+            <a:pPr indent="-323850" lvl="0" marL="457200" rtl="0" algn="l">
+              <a:spcBef>
+                <a:spcPts val="0"/>
+              </a:spcBef>
+              <a:spcAft>
+                <a:spcPts val="0"/>
+              </a:spcAft>
+              <a:buClr>
+                <a:schemeClr val="lt1"/>
+              </a:buClr>
               <a:buSzPts val="1500"/>
-              <a:buChar char="○"/>
-            </a:pPr>
-            <a:r>
-              <a:rPr lang="en" sz="1500"/>
-              <a:t>Imputing mean or median</a:t>
-            </a:r>
-            <a:endParaRPr sz="1500"/>
-          </a:p>
-          <a:p>
-            <a:pPr indent="-323850" lvl="1" marL="914400" rtl="0" algn="l">
-              <a:spcBef>
-                <a:spcPts val="0"/>
-              </a:spcBef>
-              <a:spcAft>
-                <a:spcPts val="0"/>
-              </a:spcAft>
+              <a:buFont typeface="Arial"/>
+              <a:buChar char="●"/>
+            </a:pPr>
+            <a:r>
+              <a:rPr lang="en" sz="1500">
+                <a:solidFill>
+                  <a:schemeClr val="lt1"/>
+                </a:solidFill>
+                <a:latin typeface="Arial"/>
+                <a:ea typeface="Arial"/>
+                <a:cs typeface="Arial"/>
+                <a:sym typeface="Arial"/>
+              </a:rPr>
+              <a:t>Paid media marketing campaigns (on Amazon, Facebook, Instagram, etc.)</a:t>
+            </a:r>
+            <a:endParaRPr sz="1500">
+              <a:solidFill>
+                <a:schemeClr val="lt1"/>
+              </a:solidFill>
+              <a:latin typeface="Arial"/>
+              <a:ea typeface="Arial"/>
+              <a:cs typeface="Arial"/>
+              <a:sym typeface="Arial"/>
+            </a:endParaRPr>
+          </a:p>
+          <a:p>
+            <a:pPr indent="-323850" lvl="0" marL="457200" rtl="0" algn="l">
+              <a:spcBef>
+                <a:spcPts val="0"/>
+              </a:spcBef>
+              <a:spcAft>
+                <a:spcPts val="0"/>
+              </a:spcAft>
+              <a:buClr>
+                <a:schemeClr val="lt1"/>
+              </a:buClr>
               <a:buSzPts val="1500"/>
-              <a:buChar char="○"/>
-            </a:pPr>
-            <a:r>
-              <a:rPr lang="en" sz="1500"/>
-              <a:t>Normalize using min-max scale or log transformation</a:t>
-            </a:r>
-            <a:endParaRPr sz="1500"/>
-          </a:p>
-          <a:p>
-            <a:pPr indent="-349250" lvl="0" marL="457200" rtl="0" algn="l">
-              <a:spcBef>
-                <a:spcPts val="0"/>
-              </a:spcBef>
-              <a:spcAft>
-                <a:spcPts val="0"/>
-              </a:spcAft>
-              <a:buClr>
-                <a:schemeClr val="lt2"/>
-              </a:buClr>
-              <a:buSzPts val="1900"/>
+              <a:buFont typeface="Arial"/>
               <a:buChar char="●"/>
             </a:pPr>
             <a:r>
-              <a:rPr lang="en" sz="1900">
-                <a:solidFill>
-                  <a:schemeClr val="lt2"/>
-                </a:solidFill>
+              <a:rPr lang="en" sz="1500">
+                <a:solidFill>
+                  <a:schemeClr val="lt1"/>
+                </a:solidFill>
+                <a:latin typeface="Arial"/>
+                <a:ea typeface="Arial"/>
+                <a:cs typeface="Arial"/>
+                <a:sym typeface="Arial"/>
               </a:rPr>
-              <a:t>MODELING: </a:t>
-            </a:r>
-            <a:endParaRPr sz="1900">
+              <a:t>Customer Service: Reroute and </a:t>
+            </a:r>
+            <a:r>
+              <a:rPr lang="en" sz="1500">
+                <a:solidFill>
+                  <a:schemeClr val="lt1"/>
+                </a:solidFill>
+                <a:latin typeface="Arial"/>
+                <a:ea typeface="Arial"/>
+                <a:cs typeface="Arial"/>
+                <a:sym typeface="Arial"/>
+              </a:rPr>
+              <a:t>prioritize</a:t>
+            </a:r>
+            <a:r>
+              <a:rPr lang="en" sz="1500">
+                <a:solidFill>
+                  <a:schemeClr val="lt1"/>
+                </a:solidFill>
+                <a:latin typeface="Arial"/>
+                <a:ea typeface="Arial"/>
+                <a:cs typeface="Arial"/>
+                <a:sym typeface="Arial"/>
+              </a:rPr>
+              <a:t> calls based on user’s propensity to purchase</a:t>
+            </a:r>
+            <a:endParaRPr sz="1500">
               <a:solidFill>
-                <a:schemeClr val="lt2"/>
+                <a:schemeClr val="lt1"/>
               </a:solidFill>
-            </a:endParaRPr>
-          </a:p>
-          <a:p>
-            <a:pPr indent="-323850" lvl="1" marL="914400" rtl="0" algn="l">
-              <a:spcBef>
-                <a:spcPts val="0"/>
-              </a:spcBef>
-              <a:spcAft>
-                <a:spcPts val="0"/>
-              </a:spcAft>
-              <a:buSzPts val="1500"/>
-              <a:buChar char="○"/>
-            </a:pPr>
-            <a:r>
-              <a:rPr lang="en" sz="1500"/>
-              <a:t>ADA BOOST</a:t>
-            </a:r>
-            <a:endParaRPr sz="1500"/>
-          </a:p>
-          <a:p>
-            <a:pPr indent="-323850" lvl="1" marL="914400" rtl="0" algn="l">
-              <a:spcBef>
-                <a:spcPts val="0"/>
-              </a:spcBef>
-              <a:spcAft>
-                <a:spcPts val="0"/>
-              </a:spcAft>
-              <a:buSzPts val="1500"/>
-              <a:buChar char="○"/>
-            </a:pPr>
-            <a:r>
-              <a:rPr lang="en" sz="1500"/>
-              <a:t>XG BOOST</a:t>
-            </a:r>
-            <a:endParaRPr sz="1500"/>
-          </a:p>
-          <a:p>
-            <a:pPr indent="-349250" lvl="0" marL="457200" rtl="0" algn="l">
-              <a:spcBef>
-                <a:spcPts val="0"/>
-              </a:spcBef>
-              <a:spcAft>
-                <a:spcPts val="0"/>
-              </a:spcAft>
-              <a:buClr>
-                <a:schemeClr val="lt2"/>
-              </a:buClr>
-              <a:buSzPts val="1900"/>
-              <a:buChar char="●"/>
-            </a:pPr>
-            <a:r>
-              <a:rPr lang="en" sz="1900">
-                <a:solidFill>
-                  <a:schemeClr val="lt2"/>
-                </a:solidFill>
-              </a:rPr>
-              <a:t>SELECT MORE FEATURES FROM BIGQUERY TO EXPLORE</a:t>
-            </a:r>
-            <a:endParaRPr sz="1900">
-              <a:solidFill>
-                <a:schemeClr val="lt2"/>
-              </a:solidFill>
+              <a:latin typeface="Arial"/>
+              <a:ea typeface="Arial"/>
+              <a:cs typeface="Arial"/>
+              <a:sym typeface="Arial"/>
             </a:endParaRPr>
           </a:p>
         </p:txBody>
       </p:sp>
+      <p:pic>
+        <p:nvPicPr>
+          <p:cNvPr id="187" name="Google Shape;187;p31"/>
+          <p:cNvPicPr preferRelativeResize="0"/>
+          <p:nvPr/>
+        </p:nvPicPr>
+        <p:blipFill>
+          <a:blip r:embed="rId3">
+            <a:alphaModFix/>
+          </a:blip>
+          <a:stretch>
+            <a:fillRect/>
+          </a:stretch>
+        </p:blipFill>
+        <p:spPr>
+          <a:xfrm>
+            <a:off x="4571999" y="1090450"/>
+            <a:ext cx="4280801" cy="2849775"/>
+          </a:xfrm>
+          <a:prstGeom prst="rect">
+            <a:avLst/>
+          </a:prstGeom>
+          <a:noFill/>
+          <a:ln>
+            <a:noFill/>
+          </a:ln>
+        </p:spPr>
+      </p:pic>
     </p:spTree>
   </p:cSld>
   <p:clrMapOvr>
@@ -10838,7 +11171,7 @@
   <p:cSld>
     <p:spTree>
       <p:nvGrpSpPr>
-        <p:cNvPr id="190" name="Shape 190"/>
+        <p:cNvPr id="191" name="Shape 191"/>
         <p:cNvGrpSpPr/>
         <p:nvPr/>
       </p:nvGrpSpPr>
@@ -10852,7 +11185,310 @@
       </p:grpSpPr>
       <p:sp>
         <p:nvSpPr>
-          <p:cNvPr id="191" name="Google Shape;191;p32"/>
+          <p:cNvPr id="192" name="Google Shape;192;p32"/>
+          <p:cNvSpPr txBox="1"/>
+          <p:nvPr>
+            <p:ph type="title"/>
+          </p:nvPr>
+        </p:nvSpPr>
+        <p:spPr>
+          <a:xfrm>
+            <a:off x="976900" y="1636200"/>
+            <a:ext cx="3078600" cy="1716900"/>
+          </a:xfrm>
+          <a:prstGeom prst="rect">
+            <a:avLst/>
+          </a:prstGeom>
+        </p:spPr>
+        <p:txBody>
+          <a:bodyPr anchorCtr="0" anchor="b" bIns="91425" lIns="91425" spcFirstLastPara="1" rIns="91425" wrap="square" tIns="91425">
+            <a:noAutofit/>
+          </a:bodyPr>
+          <a:lstStyle/>
+          <a:p>
+            <a:pPr indent="0" lvl="0" marL="0" rtl="0" algn="ctr">
+              <a:spcBef>
+                <a:spcPts val="0"/>
+              </a:spcBef>
+              <a:spcAft>
+                <a:spcPts val="0"/>
+              </a:spcAft>
+              <a:buSzPts val="990"/>
+              <a:buNone/>
+            </a:pPr>
+            <a:r>
+              <a:rPr lang="en" sz="3259">
+                <a:solidFill>
+                  <a:schemeClr val="lt1"/>
+                </a:solidFill>
+              </a:rPr>
+              <a:t>CONCLUSION &amp; LESSONS LEARNED</a:t>
+            </a:r>
+            <a:endParaRPr sz="3259">
+              <a:solidFill>
+                <a:schemeClr val="lt1"/>
+              </a:solidFill>
+            </a:endParaRPr>
+          </a:p>
+        </p:txBody>
+      </p:sp>
+      <p:sp>
+        <p:nvSpPr>
+          <p:cNvPr id="193" name="Google Shape;193;p32"/>
+          <p:cNvSpPr txBox="1"/>
+          <p:nvPr>
+            <p:ph idx="2" type="body"/>
+          </p:nvPr>
+        </p:nvSpPr>
+        <p:spPr>
+          <a:xfrm>
+            <a:off x="4388625" y="569850"/>
+            <a:ext cx="4387800" cy="3849600"/>
+          </a:xfrm>
+          <a:prstGeom prst="rect">
+            <a:avLst/>
+          </a:prstGeom>
+        </p:spPr>
+        <p:txBody>
+          <a:bodyPr anchorCtr="0" anchor="ctr" bIns="91425" lIns="91425" spcFirstLastPara="1" rIns="91425" wrap="square" tIns="91425">
+            <a:normAutofit lnSpcReduction="20000"/>
+          </a:bodyPr>
+          <a:lstStyle/>
+          <a:p>
+            <a:pPr indent="-349250" lvl="0" marL="457200" rtl="0" algn="l">
+              <a:spcBef>
+                <a:spcPts val="0"/>
+              </a:spcBef>
+              <a:spcAft>
+                <a:spcPts val="0"/>
+              </a:spcAft>
+              <a:buClr>
+                <a:schemeClr val="lt2"/>
+              </a:buClr>
+              <a:buSzPts val="1900"/>
+              <a:buChar char="●"/>
+            </a:pPr>
+            <a:r>
+              <a:rPr lang="en" sz="1900">
+                <a:solidFill>
+                  <a:schemeClr val="lt2"/>
+                </a:solidFill>
+              </a:rPr>
+              <a:t>99.91</a:t>
+            </a:r>
+            <a:r>
+              <a:rPr lang="en" sz="1900">
+                <a:solidFill>
+                  <a:schemeClr val="lt2"/>
+                </a:solidFill>
+              </a:rPr>
+              <a:t>% ACCURACY </a:t>
+            </a:r>
+            <a:r>
+              <a:rPr lang="en" sz="1900"/>
+              <a:t>ON CATBOOST MODEL (note: for purpose of justifying roc, lift, other metrics, etc)</a:t>
+            </a:r>
+            <a:endParaRPr sz="1900"/>
+          </a:p>
+          <a:p>
+            <a:pPr indent="-349250" lvl="0" marL="457200" rtl="0" algn="l">
+              <a:spcBef>
+                <a:spcPts val="0"/>
+              </a:spcBef>
+              <a:spcAft>
+                <a:spcPts val="0"/>
+              </a:spcAft>
+              <a:buClr>
+                <a:schemeClr val="lt2"/>
+              </a:buClr>
+              <a:buSzPts val="1900"/>
+              <a:buChar char="●"/>
+            </a:pPr>
+            <a:r>
+              <a:rPr lang="en" sz="1900">
+                <a:solidFill>
+                  <a:schemeClr val="lt2"/>
+                </a:solidFill>
+              </a:rPr>
+              <a:t>PRE-PROCESSING</a:t>
+            </a:r>
+            <a:endParaRPr sz="1900">
+              <a:solidFill>
+                <a:schemeClr val="lt2"/>
+              </a:solidFill>
+            </a:endParaRPr>
+          </a:p>
+          <a:p>
+            <a:pPr indent="-323850" lvl="1" marL="914400" rtl="0" algn="l">
+              <a:spcBef>
+                <a:spcPts val="0"/>
+              </a:spcBef>
+              <a:spcAft>
+                <a:spcPts val="0"/>
+              </a:spcAft>
+              <a:buSzPts val="1500"/>
+              <a:buChar char="○"/>
+            </a:pPr>
+            <a:r>
+              <a:rPr lang="en" sz="1500"/>
+              <a:t>Upsampling smaller labels</a:t>
+            </a:r>
+            <a:endParaRPr sz="1500"/>
+          </a:p>
+          <a:p>
+            <a:pPr indent="-323850" lvl="1" marL="914400" rtl="0" algn="l">
+              <a:spcBef>
+                <a:spcPts val="0"/>
+              </a:spcBef>
+              <a:spcAft>
+                <a:spcPts val="0"/>
+              </a:spcAft>
+              <a:buSzPts val="1500"/>
+              <a:buChar char="○"/>
+            </a:pPr>
+            <a:r>
+              <a:rPr lang="en" sz="1500"/>
+              <a:t>Imputing mean or median</a:t>
+            </a:r>
+            <a:endParaRPr sz="1500"/>
+          </a:p>
+          <a:p>
+            <a:pPr indent="-323850" lvl="1" marL="914400" rtl="0" algn="l">
+              <a:spcBef>
+                <a:spcPts val="0"/>
+              </a:spcBef>
+              <a:spcAft>
+                <a:spcPts val="0"/>
+              </a:spcAft>
+              <a:buSzPts val="1500"/>
+              <a:buChar char="○"/>
+            </a:pPr>
+            <a:r>
+              <a:rPr lang="en" sz="1500"/>
+              <a:t>Normalize using min-max scale or log transformation</a:t>
+            </a:r>
+            <a:endParaRPr sz="1500"/>
+          </a:p>
+          <a:p>
+            <a:pPr indent="-349250" lvl="0" marL="457200" rtl="0" algn="l">
+              <a:spcBef>
+                <a:spcPts val="0"/>
+              </a:spcBef>
+              <a:spcAft>
+                <a:spcPts val="0"/>
+              </a:spcAft>
+              <a:buClr>
+                <a:schemeClr val="lt2"/>
+              </a:buClr>
+              <a:buSzPts val="1900"/>
+              <a:buChar char="●"/>
+            </a:pPr>
+            <a:r>
+              <a:rPr lang="en" sz="1900">
+                <a:solidFill>
+                  <a:schemeClr val="lt2"/>
+                </a:solidFill>
+              </a:rPr>
+              <a:t>MODELING: </a:t>
+            </a:r>
+            <a:endParaRPr sz="1900">
+              <a:solidFill>
+                <a:schemeClr val="lt2"/>
+              </a:solidFill>
+            </a:endParaRPr>
+          </a:p>
+          <a:p>
+            <a:pPr indent="-323850" lvl="1" marL="914400" rtl="0" algn="l">
+              <a:spcBef>
+                <a:spcPts val="0"/>
+              </a:spcBef>
+              <a:spcAft>
+                <a:spcPts val="0"/>
+              </a:spcAft>
+              <a:buSzPts val="1500"/>
+              <a:buChar char="○"/>
+            </a:pPr>
+            <a:r>
+              <a:rPr lang="en" sz="1500"/>
+              <a:t>ADA BOOST</a:t>
+            </a:r>
+            <a:endParaRPr sz="1500"/>
+          </a:p>
+          <a:p>
+            <a:pPr indent="-323850" lvl="1" marL="914400" rtl="0" algn="l">
+              <a:spcBef>
+                <a:spcPts val="0"/>
+              </a:spcBef>
+              <a:spcAft>
+                <a:spcPts val="0"/>
+              </a:spcAft>
+              <a:buSzPts val="1500"/>
+              <a:buChar char="○"/>
+            </a:pPr>
+            <a:r>
+              <a:rPr lang="en" sz="1500"/>
+              <a:t>XG BOOST</a:t>
+            </a:r>
+            <a:endParaRPr sz="1500"/>
+          </a:p>
+          <a:p>
+            <a:pPr indent="-349250" lvl="0" marL="457200" rtl="0" algn="l">
+              <a:spcBef>
+                <a:spcPts val="0"/>
+              </a:spcBef>
+              <a:spcAft>
+                <a:spcPts val="0"/>
+              </a:spcAft>
+              <a:buClr>
+                <a:schemeClr val="lt2"/>
+              </a:buClr>
+              <a:buSzPts val="1900"/>
+              <a:buChar char="●"/>
+            </a:pPr>
+            <a:r>
+              <a:rPr lang="en" sz="1900">
+                <a:solidFill>
+                  <a:schemeClr val="lt2"/>
+                </a:solidFill>
+              </a:rPr>
+              <a:t>SELECT MORE FEATURES FROM BIGQUERY TO EXPLORE</a:t>
+            </a:r>
+            <a:endParaRPr sz="1900">
+              <a:solidFill>
+                <a:schemeClr val="lt2"/>
+              </a:solidFill>
+            </a:endParaRPr>
+          </a:p>
+        </p:txBody>
+      </p:sp>
+    </p:spTree>
+  </p:cSld>
+  <p:clrMapOvr>
+    <a:masterClrMapping/>
+  </p:clrMapOvr>
+</p:sld>
+</file>
+
+<file path=ppt/slides/slide21.xml><?xml version="1.0" encoding="utf-8"?>
+<p:sld xmlns:a="http://schemas.openxmlformats.org/drawingml/2006/main" xmlns:r="http://schemas.openxmlformats.org/officeDocument/2006/relationships" xmlns:mc="http://schemas.openxmlformats.org/markup-compatibility/2006" xmlns:mv="urn:schemas-microsoft-com:mac:vml" xmlns:p="http://schemas.openxmlformats.org/presentationml/2006/main" xmlns:c="http://schemas.openxmlformats.org/drawingml/2006/chart" xmlns:dgm="http://schemas.openxmlformats.org/drawingml/2006/diagram" xmlns:o="urn:schemas-microsoft-com:office:office" xmlns:v="urn:schemas-microsoft-com:vml" xmlns:pvml="urn:schemas-microsoft-com:office:powerpoint" xmlns:com="http://schemas.openxmlformats.org/drawingml/2006/compatibility" xmlns:p14="http://schemas.microsoft.com/office/powerpoint/2010/main" xmlns:p15="http://schemas.microsoft.com/office/powerpoint/2012/main" xmlns:ahyp="http://schemas.microsoft.com/office/drawing/2018/hyperlinkcolor">
+  <p:cSld>
+    <p:spTree>
+      <p:nvGrpSpPr>
+        <p:cNvPr id="197" name="Shape 197"/>
+        <p:cNvGrpSpPr/>
+        <p:nvPr/>
+      </p:nvGrpSpPr>
+      <p:grpSpPr>
+        <a:xfrm>
+          <a:off x="0" y="0"/>
+          <a:ext cx="0" cy="0"/>
+          <a:chOff x="0" y="0"/>
+          <a:chExt cx="0" cy="0"/>
+        </a:xfrm>
+      </p:grpSpPr>
+      <p:sp>
+        <p:nvSpPr>
+          <p:cNvPr id="198" name="Google Shape;198;p33"/>
           <p:cNvSpPr txBox="1"/>
           <p:nvPr>
             <p:ph type="ctrTitle"/>
@@ -10900,7 +11536,7 @@
       </p:sp>
       <p:sp>
         <p:nvSpPr>
-          <p:cNvPr id="192" name="Google Shape;192;p32"/>
+          <p:cNvPr id="199" name="Google Shape;199;p33"/>
           <p:cNvSpPr txBox="1"/>
           <p:nvPr>
             <p:ph idx="1" type="subTitle"/>
@@ -10954,12 +11590,12 @@
 </p:sld>
 </file>
 
-<file path=ppt/slides/slide21.xml><?xml version="1.0" encoding="utf-8"?>
+<file path=ppt/slides/slide22.xml><?xml version="1.0" encoding="utf-8"?>
 <p:sld xmlns:a="http://schemas.openxmlformats.org/drawingml/2006/main" xmlns:r="http://schemas.openxmlformats.org/officeDocument/2006/relationships" xmlns:mc="http://schemas.openxmlformats.org/markup-compatibility/2006" xmlns:mv="urn:schemas-microsoft-com:mac:vml" xmlns:p="http://schemas.openxmlformats.org/presentationml/2006/main" xmlns:c="http://schemas.openxmlformats.org/drawingml/2006/chart" xmlns:dgm="http://schemas.openxmlformats.org/drawingml/2006/diagram" xmlns:o="urn:schemas-microsoft-com:office:office" xmlns:v="urn:schemas-microsoft-com:vml" xmlns:pvml="urn:schemas-microsoft-com:office:powerpoint" xmlns:com="http://schemas.openxmlformats.org/drawingml/2006/compatibility" xmlns:p14="http://schemas.microsoft.com/office/powerpoint/2010/main" xmlns:p15="http://schemas.microsoft.com/office/powerpoint/2012/main" xmlns:ahyp="http://schemas.microsoft.com/office/drawing/2018/hyperlinkcolor">
   <p:cSld>
     <p:spTree>
       <p:nvGrpSpPr>
-        <p:cNvPr id="196" name="Shape 196"/>
+        <p:cNvPr id="203" name="Shape 203"/>
         <p:cNvGrpSpPr/>
         <p:nvPr/>
       </p:nvGrpSpPr>
@@ -10973,7 +11609,7 @@
       </p:grpSpPr>
       <p:sp>
         <p:nvSpPr>
-          <p:cNvPr id="197" name="Google Shape;197;p33"/>
+          <p:cNvPr id="204" name="Google Shape;204;p34"/>
           <p:cNvSpPr txBox="1"/>
           <p:nvPr>
             <p:ph type="title"/>
@@ -11022,7 +11658,7 @@
       </p:sp>
       <p:sp>
         <p:nvSpPr>
-          <p:cNvPr id="198" name="Google Shape;198;p33"/>
+          <p:cNvPr id="205" name="Google Shape;205;p34"/>
           <p:cNvSpPr txBox="1"/>
           <p:nvPr>
             <p:ph idx="2" type="body"/>
@@ -11956,7 +12592,15 @@
                   <a:srgbClr val="FFFFFF"/>
                 </a:solidFill>
               </a:rPr>
-              <a:t>visits</a:t>
+              <a:t>v</a:t>
+            </a:r>
+            <a:r>
+              <a:rPr i="1" lang="en" sz="1500">
+                <a:solidFill>
+                  <a:srgbClr val="FFFFFF"/>
+                </a:solidFill>
+              </a:rPr>
+              <a:t>isits or sessions</a:t>
             </a:r>
             <a:endParaRPr i="1" sz="1500">
               <a:solidFill>
@@ -12275,7 +12919,7 @@
                 <a:cs typeface="Proxima Nova"/>
                 <a:sym typeface="Proxima Nova"/>
               </a:rPr>
-              <a:t>Features broke out in the following format:</a:t>
+              <a:t>Features broke out in the following format from 12am to 11:59pm:</a:t>
             </a:r>
             <a:endParaRPr sz="1500">
               <a:solidFill>
@@ -12315,7 +12959,7 @@
                 <a:cs typeface="Proxima Nova"/>
                 <a:sym typeface="Proxima Nova"/>
               </a:rPr>
-              <a:t>Day 0</a:t>
+              <a:t>Day 0 - day of purchase</a:t>
             </a:r>
             <a:endParaRPr sz="1500">
               <a:solidFill>
@@ -12355,7 +12999,19 @@
                 <a:cs typeface="Proxima Nova"/>
                 <a:sym typeface="Proxima Nova"/>
               </a:rPr>
-              <a:t>Day 1</a:t>
+              <a:t>Day 1 - </a:t>
+            </a:r>
+            <a:r>
+              <a:rPr lang="en" sz="1500">
+                <a:solidFill>
+                  <a:schemeClr val="lt1"/>
+                </a:solidFill>
+                <a:latin typeface="Proxima Nova"/>
+                <a:ea typeface="Proxima Nova"/>
+                <a:cs typeface="Proxima Nova"/>
+                <a:sym typeface="Proxima Nova"/>
+              </a:rPr>
+              <a:t>1 day before purchase</a:t>
             </a:r>
             <a:endParaRPr sz="1500">
               <a:solidFill>
@@ -12395,7 +13051,19 @@
                 <a:cs typeface="Proxima Nova"/>
                 <a:sym typeface="Proxima Nova"/>
               </a:rPr>
-              <a:t>Day 2</a:t>
+              <a:t>Day 2 - 2</a:t>
+            </a:r>
+            <a:r>
+              <a:rPr lang="en" sz="1500">
+                <a:solidFill>
+                  <a:schemeClr val="lt1"/>
+                </a:solidFill>
+                <a:latin typeface="Proxima Nova"/>
+                <a:ea typeface="Proxima Nova"/>
+                <a:cs typeface="Proxima Nova"/>
+                <a:sym typeface="Proxima Nova"/>
+              </a:rPr>
+              <a:t> days before purchase</a:t>
             </a:r>
             <a:endParaRPr sz="1500">
               <a:solidFill>
@@ -12437,6 +13105,18 @@
               </a:rPr>
               <a:t>Day 3</a:t>
             </a:r>
+            <a:r>
+              <a:rPr lang="en" sz="1500">
+                <a:solidFill>
+                  <a:schemeClr val="lt1"/>
+                </a:solidFill>
+                <a:latin typeface="Proxima Nova"/>
+                <a:ea typeface="Proxima Nova"/>
+                <a:cs typeface="Proxima Nova"/>
+                <a:sym typeface="Proxima Nova"/>
+              </a:rPr>
+              <a:t> - 3 days before purchase</a:t>
+            </a:r>
             <a:endParaRPr sz="1500">
               <a:solidFill>
                 <a:schemeClr val="lt1"/>
@@ -12477,6 +13157,18 @@
               </a:rPr>
               <a:t>Day 4-6</a:t>
             </a:r>
+            <a:r>
+              <a:rPr lang="en" sz="1500">
+                <a:solidFill>
+                  <a:schemeClr val="lt1"/>
+                </a:solidFill>
+                <a:latin typeface="Proxima Nova"/>
+                <a:ea typeface="Proxima Nova"/>
+                <a:cs typeface="Proxima Nova"/>
+                <a:sym typeface="Proxima Nova"/>
+              </a:rPr>
+              <a:t> - 4-6 days before purchase</a:t>
+            </a:r>
             <a:endParaRPr sz="1500">
               <a:solidFill>
                 <a:schemeClr val="lt1"/>
@@ -12517,6 +13209,18 @@
               </a:rPr>
               <a:t>Week 2</a:t>
             </a:r>
+            <a:r>
+              <a:rPr lang="en" sz="1500">
+                <a:solidFill>
+                  <a:schemeClr val="lt1"/>
+                </a:solidFill>
+                <a:latin typeface="Proxima Nova"/>
+                <a:ea typeface="Proxima Nova"/>
+                <a:cs typeface="Proxima Nova"/>
+                <a:sym typeface="Proxima Nova"/>
+              </a:rPr>
+              <a:t> - 2 weeks before purchase</a:t>
+            </a:r>
             <a:endParaRPr sz="1500">
               <a:solidFill>
                 <a:schemeClr val="lt1"/>
@@ -12636,6 +13340,46 @@
                 <a:sym typeface="Proxima Nova"/>
               </a:rPr>
               <a:t>Test Set from 03/1/2017 - 03/14/2017</a:t>
+            </a:r>
+            <a:endParaRPr sz="1500">
+              <a:solidFill>
+                <a:schemeClr val="lt1"/>
+              </a:solidFill>
+              <a:latin typeface="Proxima Nova"/>
+              <a:ea typeface="Proxima Nova"/>
+              <a:cs typeface="Proxima Nova"/>
+              <a:sym typeface="Proxima Nova"/>
+            </a:endParaRPr>
+          </a:p>
+          <a:p>
+            <a:pPr indent="-323850" lvl="0" marL="457200" rtl="0" algn="l">
+              <a:lnSpc>
+                <a:spcPct val="115000"/>
+              </a:lnSpc>
+              <a:spcBef>
+                <a:spcPts val="0"/>
+              </a:spcBef>
+              <a:spcAft>
+                <a:spcPts val="0"/>
+              </a:spcAft>
+              <a:buClr>
+                <a:schemeClr val="lt1"/>
+              </a:buClr>
+              <a:buSzPts val="1500"/>
+              <a:buFont typeface="Proxima Nova"/>
+              <a:buChar char="●"/>
+            </a:pPr>
+            <a:r>
+              <a:rPr lang="en" sz="1500">
+                <a:solidFill>
+                  <a:schemeClr val="lt1"/>
+                </a:solidFill>
+                <a:latin typeface="Proxima Nova"/>
+                <a:ea typeface="Proxima Nova"/>
+                <a:cs typeface="Proxima Nova"/>
+                <a:sym typeface="Proxima Nova"/>
+              </a:rPr>
+              <a:t>Each feature is grouped by a distinct and unique visitor id over 10 days</a:t>
             </a:r>
             <a:endParaRPr sz="1500">
               <a:solidFill>
@@ -13158,6 +13902,55 @@
           </a:ln>
         </p:spPr>
       </p:pic>
+      <p:sp>
+        <p:nvSpPr>
+          <p:cNvPr id="105" name="Google Shape;105;p19"/>
+          <p:cNvSpPr txBox="1"/>
+          <p:nvPr/>
+        </p:nvSpPr>
+        <p:spPr>
+          <a:xfrm>
+            <a:off x="6253625" y="72050"/>
+            <a:ext cx="2612400" cy="400200"/>
+          </a:xfrm>
+          <a:prstGeom prst="rect">
+            <a:avLst/>
+          </a:prstGeom>
+          <a:noFill/>
+          <a:ln>
+            <a:noFill/>
+          </a:ln>
+        </p:spPr>
+        <p:txBody>
+          <a:bodyPr anchorCtr="0" anchor="t" bIns="91425" lIns="91425" spcFirstLastPara="1" rIns="91425" wrap="square" tIns="91425">
+            <a:spAutoFit/>
+          </a:bodyPr>
+          <a:lstStyle/>
+          <a:p>
+            <a:pPr indent="0" lvl="0" marL="0" rtl="0" algn="l">
+              <a:spcBef>
+                <a:spcPts val="0"/>
+              </a:spcBef>
+              <a:spcAft>
+                <a:spcPts val="0"/>
+              </a:spcAft>
+              <a:buNone/>
+            </a:pPr>
+            <a:r>
+              <a:t/>
+            </a:r>
+            <a:endParaRPr>
+              <a:solidFill>
+                <a:schemeClr val="lt1"/>
+              </a:solidFill>
+              <a:latin typeface="Proxima Nova"/>
+              <a:ea typeface="Proxima Nova"/>
+              <a:cs typeface="Proxima Nova"/>
+              <a:sym typeface="Proxima Nova"/>
+            </a:endParaRPr>
+          </a:p>
+        </p:txBody>
+      </p:sp>
     </p:spTree>
   </p:cSld>
   <p:clrMapOvr>
@@ -13178,7 +13971,7 @@
     </p:bg>
     <p:spTree>
       <p:nvGrpSpPr>
-        <p:cNvPr id="108" name="Shape 108"/>
+        <p:cNvPr id="109" name="Shape 109"/>
         <p:cNvGrpSpPr/>
         <p:nvPr/>
       </p:nvGrpSpPr>
@@ -13192,7 +13985,7 @@
       </p:grpSpPr>
       <p:sp>
         <p:nvSpPr>
-          <p:cNvPr id="109" name="Google Shape;109;p20"/>
+          <p:cNvPr id="110" name="Google Shape;110;p20"/>
           <p:cNvSpPr txBox="1"/>
           <p:nvPr>
             <p:ph type="title"/>
@@ -13241,7 +14034,7 @@
       </p:sp>
       <p:pic>
         <p:nvPicPr>
-          <p:cNvPr id="110" name="Google Shape;110;p20"/>
+          <p:cNvPr id="111" name="Google Shape;111;p20"/>
           <p:cNvPicPr preferRelativeResize="0"/>
           <p:nvPr/>
         </p:nvPicPr>
@@ -13269,7 +14062,7 @@
       </p:pic>
       <p:pic>
         <p:nvPicPr>
-          <p:cNvPr id="111" name="Google Shape;111;p20"/>
+          <p:cNvPr id="112" name="Google Shape;112;p20"/>
           <p:cNvPicPr preferRelativeResize="0"/>
           <p:nvPr/>
         </p:nvPicPr>
@@ -13315,7 +14108,7 @@
     </p:bg>
     <p:spTree>
       <p:nvGrpSpPr>
-        <p:cNvPr id="115" name="Shape 115"/>
+        <p:cNvPr id="116" name="Shape 116"/>
         <p:cNvGrpSpPr/>
         <p:nvPr/>
       </p:nvGrpSpPr>
@@ -13329,7 +14122,7 @@
       </p:grpSpPr>
       <p:sp>
         <p:nvSpPr>
-          <p:cNvPr id="116" name="Google Shape;116;p21"/>
+          <p:cNvPr id="117" name="Google Shape;117;p21"/>
           <p:cNvSpPr txBox="1"/>
           <p:nvPr>
             <p:ph type="title"/>
@@ -13378,7 +14171,7 @@
       </p:sp>
       <p:sp>
         <p:nvSpPr>
-          <p:cNvPr id="117" name="Google Shape;117;p21"/>
+          <p:cNvPr id="118" name="Google Shape;118;p21"/>
           <p:cNvSpPr txBox="1"/>
           <p:nvPr>
             <p:ph idx="1" type="body"/>
@@ -13514,7 +14307,7 @@
       </p:sp>
       <p:pic>
         <p:nvPicPr>
-          <p:cNvPr id="118" name="Google Shape;118;p21"/>
+          <p:cNvPr id="119" name="Google Shape;119;p21"/>
           <p:cNvPicPr preferRelativeResize="0"/>
           <p:nvPr/>
         </p:nvPicPr>
@@ -13549,6 +14342,285 @@
 </file>
 
 <file path=ppt/theme/theme1.xml><?xml version="1.0" encoding="utf-8"?>
+<a:theme xmlns:a="http://schemas.openxmlformats.org/drawingml/2006/main" xmlns:r="http://schemas.openxmlformats.org/officeDocument/2006/relationships">
+  <a:themeElements>
+    <a:clrScheme name="Default">
+      <a:dk1>
+        <a:srgbClr val="000000"/>
+      </a:dk1>
+      <a:lt1>
+        <a:srgbClr val="FFFFFF"/>
+      </a:lt1>
+      <a:dk2>
+        <a:srgbClr val="158158"/>
+      </a:dk2>
+      <a:lt2>
+        <a:srgbClr val="F3F3F3"/>
+      </a:lt2>
+      <a:accent1>
+        <a:srgbClr val="058DC7"/>
+      </a:accent1>
+      <a:accent2>
+        <a:srgbClr val="50B432"/>
+      </a:accent2>
+      <a:accent3>
+        <a:srgbClr val="ED561B"/>
+      </a:accent3>
+      <a:accent4>
+        <a:srgbClr val="EDEF00"/>
+      </a:accent4>
+      <a:accent5>
+        <a:srgbClr val="24CBE5"/>
+      </a:accent5>
+      <a:accent6>
+        <a:srgbClr val="64E572"/>
+      </a:accent6>
+      <a:hlink>
+        <a:srgbClr val="2200CC"/>
+      </a:hlink>
+      <a:folHlink>
+        <a:srgbClr val="551A8B"/>
+      </a:folHlink>
+    </a:clrScheme>
+    <a:fontScheme name="Office">
+      <a:majorFont>
+        <a:latin typeface="Arial"/>
+        <a:ea typeface=""/>
+        <a:cs typeface=""/>
+        <a:font script="Jpan" typeface="ＭＳ Ｐゴシック"/>
+        <a:font script="Hang" typeface="맑은 고딕"/>
+        <a:font script="Hans" typeface="宋体"/>
+        <a:font script="Hant" typeface="新細明體"/>
+        <a:font script="Arab" typeface="Times New Roman"/>
+        <a:font script="Hebr" typeface="Times New Roman"/>
+        <a:font script="Thai" typeface="Angsana New"/>
+        <a:font script="Ethi" typeface="Nyala"/>
+        <a:font script="Beng" typeface="Vrinda"/>
+        <a:font script="Gujr" typeface="Shruti"/>
+        <a:font script="Khmr" typeface="MoolBoran"/>
+        <a:font script="Knda" typeface="Tunga"/>
+        <a:font script="Guru" typeface="Raavi"/>
+        <a:font script="Cans" typeface="Euphemia"/>
+        <a:font script="Cher" typeface="Plantagenet Cherokee"/>
+        <a:font script="Yiii" typeface="Microsoft Yi Baiti"/>
+        <a:font script="Tibt" typeface="Microsoft Himalaya"/>
+        <a:font script="Thaa" typeface="MV Boli"/>
+        <a:font script="Deva" typeface="Mangal"/>
+        <a:font script="Telu" typeface="Gautami"/>
+        <a:font script="Taml" typeface="Latha"/>
+        <a:font script="Syrc" typeface="Estrangelo Edessa"/>
+        <a:font script="Orya" typeface="Kalinga"/>
+        <a:font script="Mlym" typeface="Kartika"/>
+        <a:font script="Laoo" typeface="DokChampa"/>
+        <a:font script="Sinh" typeface="Iskoola Pota"/>
+        <a:font script="Mong" typeface="Mongolian Baiti"/>
+        <a:font script="Viet" typeface="Times New Roman"/>
+        <a:font script="Uigh" typeface="Microsoft Uighur"/>
+        <a:font script="Geor" typeface="Sylfaen"/>
+      </a:majorFont>
+      <a:minorFont>
+        <a:latin typeface="Arial"/>
+        <a:ea typeface=""/>
+        <a:cs typeface=""/>
+        <a:font script="Jpan" typeface="ＭＳ Ｐゴシック"/>
+        <a:font script="Hang" typeface="맑은 고딕"/>
+        <a:font script="Hans" typeface="宋体"/>
+        <a:font script="Hant" typeface="新細明體"/>
+        <a:font script="Arab" typeface="Arial"/>
+        <a:font script="Hebr" typeface="Arial"/>
+        <a:font script="Thai" typeface="Cordia New"/>
+        <a:font script="Ethi" typeface="Nyala"/>
+        <a:font script="Beng" typeface="Vrinda"/>
+        <a:font script="Gujr" typeface="Shruti"/>
+        <a:font script="Khmr" typeface="DaunPenh"/>
+        <a:font script="Knda" typeface="Tunga"/>
+        <a:font script="Guru" typeface="Raavi"/>
+        <a:font script="Cans" typeface="Euphemia"/>
+        <a:font script="Cher" typeface="Plantagenet Cherokee"/>
+        <a:font script="Yiii" typeface="Microsoft Yi Baiti"/>
+        <a:font script="Tibt" typeface="Microsoft Himalaya"/>
+        <a:font script="Thaa" typeface="MV Boli"/>
+        <a:font script="Deva" typeface="Mangal"/>
+        <a:font script="Telu" typeface="Gautami"/>
+        <a:font script="Taml" typeface="Latha"/>
+        <a:font script="Syrc" typeface="Estrangelo Edessa"/>
+        <a:font script="Orya" typeface="Kalinga"/>
+        <a:font script="Mlym" typeface="Kartika"/>
+        <a:font script="Laoo" typeface="DokChampa"/>
+        <a:font script="Sinh" typeface="Iskoola Pota"/>
+        <a:font script="Mong" typeface="Mongolian Baiti"/>
+        <a:font script="Viet" typeface="Arial"/>
+        <a:font script="Uigh" typeface="Microsoft Uighur"/>
+        <a:font script="Geor" typeface="Sylfaen"/>
+      </a:minorFont>
+    </a:fontScheme>
+    <a:fmtScheme name="Office">
+      <a:fillStyleLst>
+        <a:solidFill>
+          <a:schemeClr val="phClr"/>
+        </a:solidFill>
+        <a:gradFill rotWithShape="1">
+          <a:gsLst>
+            <a:gs pos="0">
+              <a:schemeClr val="phClr">
+                <a:tint val="50000"/>
+                <a:satMod val="300000"/>
+              </a:schemeClr>
+            </a:gs>
+            <a:gs pos="35000">
+              <a:schemeClr val="phClr">
+                <a:tint val="37000"/>
+                <a:satMod val="300000"/>
+              </a:schemeClr>
+            </a:gs>
+            <a:gs pos="100000">
+              <a:schemeClr val="phClr">
+                <a:tint val="15000"/>
+                <a:satMod val="350000"/>
+              </a:schemeClr>
+            </a:gs>
+          </a:gsLst>
+          <a:lin ang="16200000" scaled="1"/>
+        </a:gradFill>
+        <a:gradFill rotWithShape="1">
+          <a:gsLst>
+            <a:gs pos="0">
+              <a:schemeClr val="phClr">
+                <a:tint val="100000"/>
+                <a:shade val="100000"/>
+                <a:satMod val="130000"/>
+              </a:schemeClr>
+            </a:gs>
+            <a:gs pos="100000">
+              <a:schemeClr val="phClr">
+                <a:tint val="50000"/>
+                <a:shade val="100000"/>
+                <a:satMod val="350000"/>
+              </a:schemeClr>
+            </a:gs>
+          </a:gsLst>
+          <a:lin ang="16200000" scaled="0"/>
+        </a:gradFill>
+      </a:fillStyleLst>
+      <a:lnStyleLst>
+        <a:ln w="9525" cap="flat" cmpd="sng" algn="ctr">
+          <a:solidFill>
+            <a:schemeClr val="phClr">
+              <a:shade val="95000"/>
+              <a:satMod val="105000"/>
+            </a:schemeClr>
+          </a:solidFill>
+          <a:prstDash val="solid"/>
+        </a:ln>
+        <a:ln w="25400" cap="flat" cmpd="sng" algn="ctr">
+          <a:solidFill>
+            <a:schemeClr val="phClr"/>
+          </a:solidFill>
+          <a:prstDash val="solid"/>
+        </a:ln>
+        <a:ln w="38100" cap="flat" cmpd="sng" algn="ctr">
+          <a:solidFill>
+            <a:schemeClr val="phClr"/>
+          </a:solidFill>
+          <a:prstDash val="solid"/>
+        </a:ln>
+      </a:lnStyleLst>
+      <a:effectStyleLst>
+        <a:effectStyle>
+          <a:effectLst>
+            <a:outerShdw blurRad="40000" dist="20000" dir="5400000" rotWithShape="0">
+              <a:srgbClr val="000000">
+                <a:alpha val="38000"/>
+              </a:srgbClr>
+            </a:outerShdw>
+          </a:effectLst>
+        </a:effectStyle>
+        <a:effectStyle>
+          <a:effectLst>
+            <a:outerShdw blurRad="40000" dist="23000" dir="5400000" rotWithShape="0">
+              <a:srgbClr val="000000">
+                <a:alpha val="35000"/>
+              </a:srgbClr>
+            </a:outerShdw>
+          </a:effectLst>
+        </a:effectStyle>
+        <a:effectStyle>
+          <a:effectLst>
+            <a:outerShdw blurRad="40000" dist="23000" dir="5400000" rotWithShape="0">
+              <a:srgbClr val="000000">
+                <a:alpha val="35000"/>
+              </a:srgbClr>
+            </a:outerShdw>
+          </a:effectLst>
+          <a:scene3d>
+            <a:camera prst="orthographicFront">
+              <a:rot lat="0" lon="0" rev="0"/>
+            </a:camera>
+            <a:lightRig rig="threePt" dir="t">
+              <a:rot lat="0" lon="0" rev="1200000"/>
+            </a:lightRig>
+          </a:scene3d>
+          <a:sp3d>
+            <a:bevelT w="63500" h="25400"/>
+          </a:sp3d>
+        </a:effectStyle>
+      </a:effectStyleLst>
+      <a:bgFillStyleLst>
+        <a:solidFill>
+          <a:schemeClr val="phClr"/>
+        </a:solidFill>
+        <a:gradFill rotWithShape="1">
+          <a:gsLst>
+            <a:gs pos="0">
+              <a:schemeClr val="phClr">
+                <a:tint val="40000"/>
+                <a:satMod val="350000"/>
+              </a:schemeClr>
+            </a:gs>
+            <a:gs pos="40000">
+              <a:schemeClr val="phClr">
+                <a:tint val="45000"/>
+                <a:shade val="99000"/>
+                <a:satMod val="350000"/>
+              </a:schemeClr>
+            </a:gs>
+            <a:gs pos="100000">
+              <a:schemeClr val="phClr">
+                <a:shade val="20000"/>
+                <a:satMod val="255000"/>
+              </a:schemeClr>
+            </a:gs>
+          </a:gsLst>
+          <a:path path="circle">
+            <a:fillToRect l="50000" t="-80000" r="50000" b="180000"/>
+          </a:path>
+        </a:gradFill>
+        <a:gradFill rotWithShape="1">
+          <a:gsLst>
+            <a:gs pos="0">
+              <a:schemeClr val="phClr">
+                <a:tint val="80000"/>
+                <a:satMod val="300000"/>
+              </a:schemeClr>
+            </a:gs>
+            <a:gs pos="100000">
+              <a:schemeClr val="phClr">
+                <a:shade val="30000"/>
+                <a:satMod val="200000"/>
+              </a:schemeClr>
+            </a:gs>
+          </a:gsLst>
+          <a:path path="circle">
+            <a:fillToRect l="50000" t="50000" r="50000" b="50000"/>
+          </a:path>
+        </a:gradFill>
+      </a:bgFillStyleLst>
+    </a:fmtScheme>
+  </a:themeElements>
+</a:theme>
+</file>
+
+<file path=ppt/theme/theme2.xml><?xml version="1.0" encoding="utf-8"?>
 <a:theme xmlns:a="http://schemas.openxmlformats.org/drawingml/2006/main" xmlns:r="http://schemas.openxmlformats.org/officeDocument/2006/relationships" name="Spearmint">
   <a:themeElements>
     <a:clrScheme name="Spearmint">
@@ -13825,283 +14897,4 @@
     </a:fmtScheme>
   </a:themeElements>
 </a:theme>
-</file>
-
-<file path=ppt/theme/theme2.xml><?xml version="1.0" encoding="utf-8"?>
-<a:theme xmlns:a="http://schemas.openxmlformats.org/drawingml/2006/main" xmlns:r="http://schemas.openxmlformats.org/officeDocument/2006/relationships">
-  <a:themeElements>
-    <a:clrScheme name="Default">
-      <a:dk1>
-        <a:srgbClr val="000000"/>
-      </a:dk1>
-      <a:lt1>
-        <a:srgbClr val="FFFFFF"/>
-      </a:lt1>
-      <a:dk2>
-        <a:srgbClr val="158158"/>
-      </a:dk2>
-      <a:lt2>
-        <a:srgbClr val="F3F3F3"/>
-      </a:lt2>
-      <a:accent1>
-        <a:srgbClr val="058DC7"/>
-      </a:accent1>
-      <a:accent2>
-        <a:srgbClr val="50B432"/>
-      </a:accent2>
-      <a:accent3>
-        <a:srgbClr val="ED561B"/>
-      </a:accent3>
-      <a:accent4>
-        <a:srgbClr val="EDEF00"/>
-      </a:accent4>
-      <a:accent5>
-        <a:srgbClr val="24CBE5"/>
-      </a:accent5>
-      <a:accent6>
-        <a:srgbClr val="64E572"/>
-      </a:accent6>
-      <a:hlink>
-        <a:srgbClr val="2200CC"/>
-      </a:hlink>
-      <a:folHlink>
-        <a:srgbClr val="551A8B"/>
-      </a:folHlink>
-    </a:clrScheme>
-    <a:fontScheme name="Office">
-      <a:majorFont>
-        <a:latin typeface="Arial"/>
-        <a:ea typeface=""/>
-        <a:cs typeface=""/>
-        <a:font script="Jpan" typeface="ＭＳ Ｐゴシック"/>
-        <a:font script="Hang" typeface="맑은 고딕"/>
-        <a:font script="Hans" typeface="宋体"/>
-        <a:font script="Hant" typeface="新細明體"/>
-        <a:font script="Arab" typeface="Times New Roman"/>
-        <a:font script="Hebr" typeface="Times New Roman"/>
-        <a:font script="Thai" typeface="Angsana New"/>
-        <a:font script="Ethi" typeface="Nyala"/>
-        <a:font script="Beng" typeface="Vrinda"/>
-        <a:font script="Gujr" typeface="Shruti"/>
-        <a:font script="Khmr" typeface="MoolBoran"/>
-        <a:font script="Knda" typeface="Tunga"/>
-        <a:font script="Guru" typeface="Raavi"/>
-        <a:font script="Cans" typeface="Euphemia"/>
-        <a:font script="Cher" typeface="Plantagenet Cherokee"/>
-        <a:font script="Yiii" typeface="Microsoft Yi Baiti"/>
-        <a:font script="Tibt" typeface="Microsoft Himalaya"/>
-        <a:font script="Thaa" typeface="MV Boli"/>
-        <a:font script="Deva" typeface="Mangal"/>
-        <a:font script="Telu" typeface="Gautami"/>
-        <a:font script="Taml" typeface="Latha"/>
-        <a:font script="Syrc" typeface="Estrangelo Edessa"/>
-        <a:font script="Orya" typeface="Kalinga"/>
-        <a:font script="Mlym" typeface="Kartika"/>
-        <a:font script="Laoo" typeface="DokChampa"/>
-        <a:font script="Sinh" typeface="Iskoola Pota"/>
-        <a:font script="Mong" typeface="Mongolian Baiti"/>
-        <a:font script="Viet" typeface="Times New Roman"/>
-        <a:font script="Uigh" typeface="Microsoft Uighur"/>
-        <a:font script="Geor" typeface="Sylfaen"/>
-      </a:majorFont>
-      <a:minorFont>
-        <a:latin typeface="Arial"/>
-        <a:ea typeface=""/>
-        <a:cs typeface=""/>
-        <a:font script="Jpan" typeface="ＭＳ Ｐゴシック"/>
-        <a:font script="Hang" typeface="맑은 고딕"/>
-        <a:font script="Hans" typeface="宋体"/>
-        <a:font script="Hant" typeface="新細明體"/>
-        <a:font script="Arab" typeface="Arial"/>
-        <a:font script="Hebr" typeface="Arial"/>
-        <a:font script="Thai" typeface="Cordia New"/>
-        <a:font script="Ethi" typeface="Nyala"/>
-        <a:font script="Beng" typeface="Vrinda"/>
-        <a:font script="Gujr" typeface="Shruti"/>
-        <a:font script="Khmr" typeface="DaunPenh"/>
-        <a:font script="Knda" typeface="Tunga"/>
-        <a:font script="Guru" typeface="Raavi"/>
-        <a:font script="Cans" typeface="Euphemia"/>
-        <a:font script="Cher" typeface="Plantagenet Cherokee"/>
-        <a:font script="Yiii" typeface="Microsoft Yi Baiti"/>
-        <a:font script="Tibt" typeface="Microsoft Himalaya"/>
-        <a:font script="Thaa" typeface="MV Boli"/>
-        <a:font script="Deva" typeface="Mangal"/>
-        <a:font script="Telu" typeface="Gautami"/>
-        <a:font script="Taml" typeface="Latha"/>
-        <a:font script="Syrc" typeface="Estrangelo Edessa"/>
-        <a:font script="Orya" typeface="Kalinga"/>
-        <a:font script="Mlym" typeface="Kartika"/>
-        <a:font script="Laoo" typeface="DokChampa"/>
-        <a:font script="Sinh" typeface="Iskoola Pota"/>
-        <a:font script="Mong" typeface="Mongolian Baiti"/>
-        <a:font script="Viet" typeface="Arial"/>
-        <a:font script="Uigh" typeface="Microsoft Uighur"/>
-        <a:font script="Geor" typeface="Sylfaen"/>
-      </a:minorFont>
-    </a:fontScheme>
-    <a:fmtScheme name="Office">
-      <a:fillStyleLst>
-        <a:solidFill>
-          <a:schemeClr val="phClr"/>
-        </a:solidFill>
-        <a:gradFill rotWithShape="1">
-          <a:gsLst>
-            <a:gs pos="0">
-              <a:schemeClr val="phClr">
-                <a:tint val="50000"/>
-                <a:satMod val="300000"/>
-              </a:schemeClr>
-            </a:gs>
-            <a:gs pos="35000">
-              <a:schemeClr val="phClr">
-                <a:tint val="37000"/>
-                <a:satMod val="300000"/>
-              </a:schemeClr>
-            </a:gs>
-            <a:gs pos="100000">
-              <a:schemeClr val="phClr">
-                <a:tint val="15000"/>
-                <a:satMod val="350000"/>
-              </a:schemeClr>
-            </a:gs>
-          </a:gsLst>
-          <a:lin ang="16200000" scaled="1"/>
-        </a:gradFill>
-        <a:gradFill rotWithShape="1">
-          <a:gsLst>
-            <a:gs pos="0">
-              <a:schemeClr val="phClr">
-                <a:tint val="100000"/>
-                <a:shade val="100000"/>
-                <a:satMod val="130000"/>
-              </a:schemeClr>
-            </a:gs>
-            <a:gs pos="100000">
-              <a:schemeClr val="phClr">
-                <a:tint val="50000"/>
-                <a:shade val="100000"/>
-                <a:satMod val="350000"/>
-              </a:schemeClr>
-            </a:gs>
-          </a:gsLst>
-          <a:lin ang="16200000" scaled="0"/>
-        </a:gradFill>
-      </a:fillStyleLst>
-      <a:lnStyleLst>
-        <a:ln w="9525" cap="flat" cmpd="sng" algn="ctr">
-          <a:solidFill>
-            <a:schemeClr val="phClr">
-              <a:shade val="95000"/>
-              <a:satMod val="105000"/>
-            </a:schemeClr>
-          </a:solidFill>
-          <a:prstDash val="solid"/>
-        </a:ln>
-        <a:ln w="25400" cap="flat" cmpd="sng" algn="ctr">
-          <a:solidFill>
-            <a:schemeClr val="phClr"/>
-          </a:solidFill>
-          <a:prstDash val="solid"/>
-        </a:ln>
-        <a:ln w="38100" cap="flat" cmpd="sng" algn="ctr">
-          <a:solidFill>
-            <a:schemeClr val="phClr"/>
-          </a:solidFill>
-          <a:prstDash val="solid"/>
-        </a:ln>
-      </a:lnStyleLst>
-      <a:effectStyleLst>
-        <a:effectStyle>
-          <a:effectLst>
-            <a:outerShdw blurRad="40000" dist="20000" dir="5400000" rotWithShape="0">
-              <a:srgbClr val="000000">
-                <a:alpha val="38000"/>
-              </a:srgbClr>
-            </a:outerShdw>
-          </a:effectLst>
-        </a:effectStyle>
-        <a:effectStyle>
-          <a:effectLst>
-            <a:outerShdw blurRad="40000" dist="23000" dir="5400000" rotWithShape="0">
-              <a:srgbClr val="000000">
-                <a:alpha val="35000"/>
-              </a:srgbClr>
-            </a:outerShdw>
-          </a:effectLst>
-        </a:effectStyle>
-        <a:effectStyle>
-          <a:effectLst>
-            <a:outerShdw blurRad="40000" dist="23000" dir="5400000" rotWithShape="0">
-              <a:srgbClr val="000000">
-                <a:alpha val="35000"/>
-              </a:srgbClr>
-            </a:outerShdw>
-          </a:effectLst>
-          <a:scene3d>
-            <a:camera prst="orthographicFront">
-              <a:rot lat="0" lon="0" rev="0"/>
-            </a:camera>
-            <a:lightRig rig="threePt" dir="t">
-              <a:rot lat="0" lon="0" rev="1200000"/>
-            </a:lightRig>
-          </a:scene3d>
-          <a:sp3d>
-            <a:bevelT w="63500" h="25400"/>
-          </a:sp3d>
-        </a:effectStyle>
-      </a:effectStyleLst>
-      <a:bgFillStyleLst>
-        <a:solidFill>
-          <a:schemeClr val="phClr"/>
-        </a:solidFill>
-        <a:gradFill rotWithShape="1">
-          <a:gsLst>
-            <a:gs pos="0">
-              <a:schemeClr val="phClr">
-                <a:tint val="40000"/>
-                <a:satMod val="350000"/>
-              </a:schemeClr>
-            </a:gs>
-            <a:gs pos="40000">
-              <a:schemeClr val="phClr">
-                <a:tint val="45000"/>
-                <a:shade val="99000"/>
-                <a:satMod val="350000"/>
-              </a:schemeClr>
-            </a:gs>
-            <a:gs pos="100000">
-              <a:schemeClr val="phClr">
-                <a:shade val="20000"/>
-                <a:satMod val="255000"/>
-              </a:schemeClr>
-            </a:gs>
-          </a:gsLst>
-          <a:path path="circle">
-            <a:fillToRect l="50000" t="-80000" r="50000" b="180000"/>
-          </a:path>
-        </a:gradFill>
-        <a:gradFill rotWithShape="1">
-          <a:gsLst>
-            <a:gs pos="0">
-              <a:schemeClr val="phClr">
-                <a:tint val="80000"/>
-                <a:satMod val="300000"/>
-              </a:schemeClr>
-            </a:gs>
-            <a:gs pos="100000">
-              <a:schemeClr val="phClr">
-                <a:shade val="30000"/>
-                <a:satMod val="200000"/>
-              </a:schemeClr>
-            </a:gs>
-          </a:gsLst>
-          <a:path path="circle">
-            <a:fillToRect l="50000" t="50000" r="50000" b="50000"/>
-          </a:path>
-        </a:gradFill>
-      </a:bgFillStyleLst>
-    </a:fmtScheme>
-  </a:themeElements>
-</a:theme>
 </file>
</xml_diff>